<commit_message>
added descriptions in slides
</commit_message>
<xml_diff>
--- a/SW Test Demo.pptx
+++ b/SW Test Demo.pptx
@@ -10,9 +10,11 @@
     <p:sldId id="259" r:id="rId4"/>
     <p:sldId id="258" r:id="rId5"/>
     <p:sldId id="260" r:id="rId6"/>
-    <p:sldId id="261" r:id="rId7"/>
-    <p:sldId id="262" r:id="rId8"/>
-    <p:sldId id="263" r:id="rId9"/>
+    <p:sldId id="265" r:id="rId7"/>
+    <p:sldId id="261" r:id="rId8"/>
+    <p:sldId id="264" r:id="rId9"/>
+    <p:sldId id="262" r:id="rId10"/>
+    <p:sldId id="263" r:id="rId11"/>
   </p:sldIdLst>
   <p:sldSz cx="12192000" cy="6858000"/>
   <p:notesSz cx="6858000" cy="9144000"/>
@@ -6154,6 +6156,89 @@
 </p:sld>
 </file>
 
+<file path=ppt/slides/slide10.xml><?xml version="1.0" encoding="utf-8"?>
+<p:sld xmlns:a="http://schemas.openxmlformats.org/drawingml/2006/main" xmlns:r="http://schemas.openxmlformats.org/officeDocument/2006/relationships" xmlns:p="http://schemas.openxmlformats.org/presentationml/2006/main">
+  <p:cSld>
+    <p:spTree>
+      <p:nvGrpSpPr>
+        <p:cNvPr id="1" name=""/>
+        <p:cNvGrpSpPr/>
+        <p:nvPr/>
+      </p:nvGrpSpPr>
+      <p:grpSpPr>
+        <a:xfrm>
+          <a:off x="0" y="0"/>
+          <a:ext cx="0" cy="0"/>
+          <a:chOff x="0" y="0"/>
+          <a:chExt cx="0" cy="0"/>
+        </a:xfrm>
+      </p:grpSpPr>
+      <p:sp>
+        <p:nvSpPr>
+          <p:cNvPr id="2" name="Title 1">
+            <a:extLst>
+              <a:ext uri="{FF2B5EF4-FFF2-40B4-BE49-F238E27FC236}">
+                <a16:creationId xmlns:a16="http://schemas.microsoft.com/office/drawing/2014/main" id="{A8B43563-EFEA-E9D3-48BB-3AD539087CD1}"/>
+              </a:ext>
+            </a:extLst>
+          </p:cNvPr>
+          <p:cNvSpPr>
+            <a:spLocks noGrp="1"/>
+          </p:cNvSpPr>
+          <p:nvPr>
+            <p:ph type="title"/>
+          </p:nvPr>
+        </p:nvSpPr>
+        <p:spPr/>
+        <p:txBody>
+          <a:bodyPr/>
+          <a:lstStyle/>
+          <a:p>
+            <a:r>
+              <a:rPr lang="en-GB" dirty="0"/>
+              <a:t>Final Test Report</a:t>
+            </a:r>
+          </a:p>
+        </p:txBody>
+      </p:sp>
+      <p:sp>
+        <p:nvSpPr>
+          <p:cNvPr id="3" name="Content Placeholder 2">
+            <a:extLst>
+              <a:ext uri="{FF2B5EF4-FFF2-40B4-BE49-F238E27FC236}">
+                <a16:creationId xmlns:a16="http://schemas.microsoft.com/office/drawing/2014/main" id="{348F42C1-F152-6218-E6C9-222916743D3E}"/>
+              </a:ext>
+            </a:extLst>
+          </p:cNvPr>
+          <p:cNvSpPr>
+            <a:spLocks noGrp="1"/>
+          </p:cNvSpPr>
+          <p:nvPr>
+            <p:ph idx="1"/>
+          </p:nvPr>
+        </p:nvSpPr>
+        <p:spPr/>
+        <p:txBody>
+          <a:bodyPr/>
+          <a:lstStyle/>
+          <a:p>
+            <a:endParaRPr lang="en-GB"/>
+          </a:p>
+        </p:txBody>
+      </p:sp>
+    </p:spTree>
+    <p:extLst>
+      <p:ext uri="{BB962C8B-B14F-4D97-AF65-F5344CB8AC3E}">
+        <p14:creationId xmlns:p14="http://schemas.microsoft.com/office/powerpoint/2010/main" val="2034729977"/>
+      </p:ext>
+    </p:extLst>
+  </p:cSld>
+  <p:clrMapOvr>
+    <a:masterClrMapping/>
+  </p:clrMapOvr>
+</p:sld>
+</file>
+
 <file path=ppt/slides/slide2.xml><?xml version="1.0" encoding="utf-8"?>
 <p:sld xmlns:a="http://schemas.openxmlformats.org/drawingml/2006/main" xmlns:r="http://schemas.openxmlformats.org/officeDocument/2006/relationships" xmlns:p="http://schemas.openxmlformats.org/presentationml/2006/main">
   <p:cSld>
@@ -6217,7 +6302,9 @@
         </p:nvSpPr>
         <p:spPr/>
         <p:txBody>
-          <a:bodyPr/>
+          <a:bodyPr>
+            <a:normAutofit fontScale="92500" lnSpcReduction="10000"/>
+          </a:bodyPr>
           <a:lstStyle/>
           <a:p>
             <a:r>
@@ -6235,6 +6322,12 @@
             <a:r>
               <a:rPr lang="en-GB" dirty="0"/>
               <a:t>Test plan </a:t>
+            </a:r>
+          </a:p>
+          <a:p>
+            <a:r>
+              <a:rPr lang="en-GB" dirty="0"/>
+              <a:t>Test Strategy</a:t>
             </a:r>
           </a:p>
           <a:p>
@@ -6940,7 +7033,7 @@
         <p:spPr>
           <a:xfrm>
             <a:off x="1484311" y="110764"/>
-            <a:ext cx="10018713" cy="1312683"/>
+            <a:ext cx="10018713" cy="860197"/>
           </a:xfrm>
         </p:spPr>
         <p:txBody>
@@ -6972,13 +7065,13 @@
         </p:nvSpPr>
         <p:spPr>
           <a:xfrm>
-            <a:off x="1484310" y="1310326"/>
-            <a:ext cx="10018713" cy="4619133"/>
+            <a:off x="1484310" y="970962"/>
+            <a:ext cx="10018713" cy="5420412"/>
           </a:xfrm>
         </p:spPr>
         <p:txBody>
           <a:bodyPr anchor="t">
-            <a:normAutofit/>
+            <a:normAutofit lnSpcReduction="10000"/>
           </a:bodyPr>
           <a:lstStyle/>
           <a:p>
@@ -7005,7 +7098,7 @@
               <a:t>: </a:t>
             </a:r>
             <a:r>
-              <a:rPr lang="en-GB" sz="1800" dirty="0">
+              <a:rPr lang="en-GB" sz="1400" dirty="0">
                 <a:effectLst/>
                 <a:latin typeface="Calibri" panose="020F0502020204030204" pitchFamily="34" charset="0"/>
                 <a:ea typeface="Calibri" panose="020F0502020204030204" pitchFamily="34" charset="0"/>
@@ -7019,18 +7112,6 @@
               <a:buFont typeface="Arial" panose="020B0604020202020204" pitchFamily="34" charset="0"/>
               <a:buChar char="•"/>
             </a:pPr>
-            <a:endParaRPr lang="en-GB" sz="1800" b="1" dirty="0">
-              <a:effectLst/>
-              <a:latin typeface="Calibri" panose="020F0502020204030204" pitchFamily="34" charset="0"/>
-              <a:ea typeface="Calibri" panose="020F0502020204030204" pitchFamily="34" charset="0"/>
-              <a:cs typeface="Times New Roman" panose="02020603050405020304" pitchFamily="18" charset="0"/>
-            </a:endParaRPr>
-          </a:p>
-          <a:p>
-            <a:pPr>
-              <a:buFont typeface="Arial" panose="020B0604020202020204" pitchFamily="34" charset="0"/>
-              <a:buChar char="•"/>
-            </a:pPr>
             <a:r>
               <a:rPr lang="en-GB" sz="1800" b="1" dirty="0">
                 <a:effectLst/>
@@ -7041,7 +7122,7 @@
               <a:t>Scope: </a:t>
             </a:r>
             <a:r>
-              <a:rPr lang="en-GB" sz="1800" dirty="0">
+              <a:rPr lang="en-GB" sz="1400" dirty="0">
                 <a:effectLst/>
                 <a:latin typeface="Calibri" panose="020F0502020204030204" pitchFamily="34" charset="0"/>
                 <a:ea typeface="Calibri" panose="020F0502020204030204" pitchFamily="34" charset="0"/>
@@ -7049,17 +7130,6 @@
               </a:rPr>
               <a:t>This test plan covers the testing of all features and functionalities of the RiskPoint Group website, including the user interface, navigation, content management, and backend integration.</a:t>
             </a:r>
-          </a:p>
-          <a:p>
-            <a:pPr>
-              <a:buFont typeface="Arial" panose="020B0604020202020204" pitchFamily="34" charset="0"/>
-              <a:buChar char="•"/>
-            </a:pPr>
-            <a:endParaRPr lang="en-GB" sz="1800" b="1" dirty="0">
-              <a:latin typeface="Calibri" panose="020F0502020204030204" pitchFamily="34" charset="0"/>
-              <a:ea typeface="Calibri" panose="020F0502020204030204" pitchFamily="34" charset="0"/>
-              <a:cs typeface="Times New Roman" panose="02020603050405020304" pitchFamily="18" charset="0"/>
-            </a:endParaRPr>
           </a:p>
           <a:p>
             <a:pPr>
@@ -7216,6 +7286,182 @@
             </a:r>
           </a:p>
           <a:p>
+            <a:pPr marL="0" marR="0" algn="just">
+              <a:lnSpc>
+                <a:spcPct val="107000"/>
+              </a:lnSpc>
+              <a:spcBef>
+                <a:spcPts val="0"/>
+              </a:spcBef>
+              <a:spcAft>
+                <a:spcPts val="800"/>
+              </a:spcAft>
+            </a:pPr>
+            <a:r>
+              <a:rPr lang="en-GB" sz="1800" b="1" kern="100" dirty="0">
+                <a:effectLst/>
+                <a:latin typeface="Calibri" panose="020F0502020204030204" pitchFamily="34" charset="0"/>
+                <a:ea typeface="Calibri" panose="020F0502020204030204" pitchFamily="34" charset="0"/>
+                <a:cs typeface="Times New Roman" panose="02020603050405020304" pitchFamily="18" charset="0"/>
+              </a:rPr>
+              <a:t>Features to be Tested:</a:t>
+            </a:r>
+            <a:endParaRPr lang="en-GB" sz="1800" kern="100" dirty="0">
+              <a:effectLst/>
+              <a:latin typeface="Calibri" panose="020F0502020204030204" pitchFamily="34" charset="0"/>
+              <a:ea typeface="Calibri" panose="020F0502020204030204" pitchFamily="34" charset="0"/>
+              <a:cs typeface="Times New Roman" panose="02020603050405020304" pitchFamily="18" charset="0"/>
+            </a:endParaRPr>
+          </a:p>
+          <a:p>
+            <a:pPr marL="800100" lvl="1" indent="-342900" algn="just">
+              <a:lnSpc>
+                <a:spcPct val="107000"/>
+              </a:lnSpc>
+              <a:spcBef>
+                <a:spcPts val="0"/>
+              </a:spcBef>
+              <a:spcAft>
+                <a:spcPts val="800"/>
+              </a:spcAft>
+              <a:buSzPts val="1000"/>
+              <a:buFont typeface="Symbol" panose="05050102010706020507" pitchFamily="18" charset="2"/>
+              <a:buChar char=""/>
+              <a:tabLst>
+                <a:tab pos="457200" algn="l"/>
+              </a:tabLst>
+            </a:pPr>
+            <a:r>
+              <a:rPr lang="en-GB" sz="1400" b="1" kern="100" dirty="0">
+                <a:effectLst/>
+                <a:latin typeface="Calibri" panose="020F0502020204030204" pitchFamily="34" charset="0"/>
+                <a:ea typeface="Calibri" panose="020F0502020204030204" pitchFamily="34" charset="0"/>
+                <a:cs typeface="Times New Roman" panose="02020603050405020304" pitchFamily="18" charset="0"/>
+              </a:rPr>
+              <a:t>Homepage:</a:t>
+            </a:r>
+            <a:r>
+              <a:rPr lang="en-GB" sz="1400" kern="100" dirty="0">
+                <a:effectLst/>
+                <a:latin typeface="Calibri" panose="020F0502020204030204" pitchFamily="34" charset="0"/>
+                <a:ea typeface="Calibri" panose="020F0502020204030204" pitchFamily="34" charset="0"/>
+                <a:cs typeface="Times New Roman" panose="02020603050405020304" pitchFamily="18" charset="0"/>
+              </a:rPr>
+              <a:t> Validate content, layout, and navigation.</a:t>
+            </a:r>
+          </a:p>
+          <a:p>
+            <a:pPr marL="800100" lvl="1" indent="-342900" algn="just">
+              <a:lnSpc>
+                <a:spcPct val="107000"/>
+              </a:lnSpc>
+              <a:spcBef>
+                <a:spcPts val="0"/>
+              </a:spcBef>
+              <a:spcAft>
+                <a:spcPts val="800"/>
+              </a:spcAft>
+              <a:buSzPts val="1000"/>
+              <a:buFont typeface="Symbol" panose="05050102010706020507" pitchFamily="18" charset="2"/>
+              <a:buChar char=""/>
+              <a:tabLst>
+                <a:tab pos="457200" algn="l"/>
+              </a:tabLst>
+            </a:pPr>
+            <a:r>
+              <a:rPr lang="en-GB" sz="1400" b="1" kern="100" dirty="0">
+                <a:effectLst/>
+                <a:latin typeface="Calibri" panose="020F0502020204030204" pitchFamily="34" charset="0"/>
+                <a:ea typeface="Calibri" panose="020F0502020204030204" pitchFamily="34" charset="0"/>
+                <a:cs typeface="Times New Roman" panose="02020603050405020304" pitchFamily="18" charset="0"/>
+              </a:rPr>
+              <a:t>Claims Tab:</a:t>
+            </a:r>
+            <a:r>
+              <a:rPr lang="en-GB" sz="1400" kern="100" dirty="0">
+                <a:effectLst/>
+                <a:latin typeface="Calibri" panose="020F0502020204030204" pitchFamily="34" charset="0"/>
+                <a:ea typeface="Calibri" panose="020F0502020204030204" pitchFamily="34" charset="0"/>
+                <a:cs typeface="Times New Roman" panose="02020603050405020304" pitchFamily="18" charset="0"/>
+              </a:rPr>
+              <a:t> Test content accuracy.</a:t>
+            </a:r>
+          </a:p>
+          <a:p>
+            <a:pPr marL="800100" lvl="1" indent="-342900" algn="just">
+              <a:lnSpc>
+                <a:spcPct val="107000"/>
+              </a:lnSpc>
+              <a:spcBef>
+                <a:spcPts val="0"/>
+              </a:spcBef>
+              <a:spcAft>
+                <a:spcPts val="800"/>
+              </a:spcAft>
+              <a:buSzPts val="1000"/>
+              <a:buFont typeface="Symbol" panose="05050102010706020507" pitchFamily="18" charset="2"/>
+              <a:buChar char=""/>
+              <a:tabLst>
+                <a:tab pos="457200" algn="l"/>
+              </a:tabLst>
+            </a:pPr>
+            <a:r>
+              <a:rPr lang="en-GB" sz="1400" b="1" kern="100" dirty="0">
+                <a:effectLst/>
+                <a:latin typeface="Calibri" panose="020F0502020204030204" pitchFamily="34" charset="0"/>
+                <a:ea typeface="Calibri" panose="020F0502020204030204" pitchFamily="34" charset="0"/>
+                <a:cs typeface="Times New Roman" panose="02020603050405020304" pitchFamily="18" charset="0"/>
+              </a:rPr>
+              <a:t>Report a Claim Page:</a:t>
+            </a:r>
+            <a:r>
+              <a:rPr lang="en-GB" sz="1400" kern="100" dirty="0">
+                <a:effectLst/>
+                <a:latin typeface="Calibri" panose="020F0502020204030204" pitchFamily="34" charset="0"/>
+                <a:ea typeface="Calibri" panose="020F0502020204030204" pitchFamily="34" charset="0"/>
+                <a:cs typeface="Times New Roman" panose="02020603050405020304" pitchFamily="18" charset="0"/>
+              </a:rPr>
+              <a:t> Verify selection of Claim Type, Selection of Language, navigating to the details page to fill the form in respective language and downloadable resources.</a:t>
+            </a:r>
+          </a:p>
+          <a:p>
+            <a:pPr marL="800100" lvl="1" indent="-342900" algn="just">
+              <a:lnSpc>
+                <a:spcPct val="107000"/>
+              </a:lnSpc>
+              <a:spcBef>
+                <a:spcPts val="0"/>
+              </a:spcBef>
+              <a:spcAft>
+                <a:spcPts val="800"/>
+              </a:spcAft>
+              <a:buSzPts val="1000"/>
+              <a:buFont typeface="Symbol" panose="05050102010706020507" pitchFamily="18" charset="2"/>
+              <a:buChar char=""/>
+              <a:tabLst>
+                <a:tab pos="457200" algn="l"/>
+              </a:tabLst>
+            </a:pPr>
+            <a:r>
+              <a:rPr lang="en-GB" sz="1400" b="1" kern="100" dirty="0">
+                <a:effectLst/>
+                <a:latin typeface="Calibri" panose="020F0502020204030204" pitchFamily="34" charset="0"/>
+                <a:ea typeface="Calibri" panose="020F0502020204030204" pitchFamily="34" charset="0"/>
+                <a:cs typeface="Times New Roman" panose="02020603050405020304" pitchFamily="18" charset="0"/>
+              </a:rPr>
+              <a:t>Claims Details page:</a:t>
+            </a:r>
+            <a:r>
+              <a:rPr lang="en-GB" sz="1400" kern="100" dirty="0">
+                <a:effectLst/>
+                <a:latin typeface="Calibri" panose="020F0502020204030204" pitchFamily="34" charset="0"/>
+                <a:ea typeface="Calibri" panose="020F0502020204030204" pitchFamily="34" charset="0"/>
+                <a:cs typeface="Times New Roman" panose="02020603050405020304" pitchFamily="18" charset="0"/>
+              </a:rPr>
+              <a:t> Filling up the details in the respective language, validate the fields, endure that the details are submitted successfully.</a:t>
+            </a:r>
+          </a:p>
+          <a:p>
             <a:pPr marL="457200" lvl="1" indent="0" algn="just">
               <a:lnSpc>
                 <a:spcPct val="107000"/>
@@ -7231,18 +7477,6 @@
               <a:tabLst>
                 <a:tab pos="457200" algn="l"/>
               </a:tabLst>
-            </a:pPr>
-            <a:endParaRPr lang="en-GB" sz="1400" kern="100" dirty="0">
-              <a:effectLst/>
-              <a:latin typeface="Calibri" panose="020F0502020204030204" pitchFamily="34" charset="0"/>
-              <a:ea typeface="Calibri" panose="020F0502020204030204" pitchFamily="34" charset="0"/>
-              <a:cs typeface="Times New Roman" panose="02020603050405020304" pitchFamily="18" charset="0"/>
-            </a:endParaRPr>
-          </a:p>
-          <a:p>
-            <a:pPr lvl="1">
-              <a:buFont typeface="Arial" panose="020B0604020202020204" pitchFamily="34" charset="0"/>
-              <a:buChar char="•"/>
             </a:pPr>
             <a:endParaRPr lang="en-GB" sz="1400" dirty="0">
               <a:effectLst/>
@@ -7298,7 +7532,7 @@
           <p:cNvPr id="2" name="Title 1">
             <a:extLst>
               <a:ext uri="{FF2B5EF4-FFF2-40B4-BE49-F238E27FC236}">
-                <a16:creationId xmlns:a16="http://schemas.microsoft.com/office/drawing/2014/main" id="{6EB53A5F-7FFF-7D0F-6D73-9374016F3FCD}"/>
+                <a16:creationId xmlns:a16="http://schemas.microsoft.com/office/drawing/2014/main" id="{A4BB6926-6A53-A0D3-C226-A43AFACF3C09}"/>
               </a:ext>
             </a:extLst>
           </p:cNvPr>
@@ -7311,8 +7545,8 @@
         </p:nvSpPr>
         <p:spPr>
           <a:xfrm>
-            <a:off x="1484311" y="157893"/>
-            <a:ext cx="10506584" cy="709373"/>
+            <a:off x="1484311" y="176752"/>
+            <a:ext cx="10018713" cy="1001600"/>
           </a:xfrm>
         </p:spPr>
         <p:txBody>
@@ -7320,179 +7554,33 @@
           <a:lstStyle/>
           <a:p>
             <a:r>
-              <a:rPr lang="en-GB" dirty="0"/>
-              <a:t>Test Execution</a:t>
-            </a:r>
-          </a:p>
-        </p:txBody>
-      </p:sp>
-      <p:sp>
-        <p:nvSpPr>
-          <p:cNvPr id="4" name="Rectangle 3">
+              <a:rPr lang="da-DK" dirty="0"/>
+              <a:t>Test Strategy</a:t>
+            </a:r>
+            <a:endParaRPr lang="en-GB" dirty="0"/>
+          </a:p>
+        </p:txBody>
+      </p:sp>
+      <p:sp>
+        <p:nvSpPr>
+          <p:cNvPr id="3" name="Content Placeholder 2">
             <a:extLst>
               <a:ext uri="{FF2B5EF4-FFF2-40B4-BE49-F238E27FC236}">
-                <a16:creationId xmlns:a16="http://schemas.microsoft.com/office/drawing/2014/main" id="{BB3617FA-871B-1A43-E891-137B4D004C45}"/>
+                <a16:creationId xmlns:a16="http://schemas.microsoft.com/office/drawing/2014/main" id="{70BB514F-6394-F542-546D-5AFB2AAC92FD}"/>
               </a:ext>
             </a:extLst>
           </p:cNvPr>
-          <p:cNvSpPr/>
-          <p:nvPr/>
+          <p:cNvSpPr>
+            <a:spLocks noGrp="1"/>
+          </p:cNvSpPr>
+          <p:nvPr>
+            <p:ph idx="1"/>
+          </p:nvPr>
         </p:nvSpPr>
         <p:spPr>
           <a:xfrm>
-            <a:off x="1995341" y="1225466"/>
-            <a:ext cx="1904214" cy="1072299"/>
-          </a:xfrm>
-          <a:prstGeom prst="rect">
-            <a:avLst/>
-          </a:prstGeom>
-        </p:spPr>
-        <p:style>
-          <a:lnRef idx="2">
-            <a:schemeClr val="accent1">
-              <a:shade val="15000"/>
-            </a:schemeClr>
-          </a:lnRef>
-          <a:fillRef idx="1">
-            <a:schemeClr val="accent1"/>
-          </a:fillRef>
-          <a:effectRef idx="0">
-            <a:schemeClr val="accent1"/>
-          </a:effectRef>
-          <a:fontRef idx="minor">
-            <a:schemeClr val="lt1"/>
-          </a:fontRef>
-        </p:style>
-        <p:txBody>
-          <a:bodyPr rtlCol="0" anchor="ctr"/>
-          <a:lstStyle/>
-          <a:p>
-            <a:pPr algn="ctr"/>
-            <a:r>
-              <a:rPr lang="en-GB" dirty="0"/>
-              <a:t>Define Scenarios</a:t>
-            </a:r>
-          </a:p>
-        </p:txBody>
-      </p:sp>
-      <p:sp>
-        <p:nvSpPr>
-          <p:cNvPr id="5" name="Rectangle 4">
-            <a:extLst>
-              <a:ext uri="{FF2B5EF4-FFF2-40B4-BE49-F238E27FC236}">
-                <a16:creationId xmlns:a16="http://schemas.microsoft.com/office/drawing/2014/main" id="{CF143FBA-5732-84FA-E03E-BAF2B9B4608E}"/>
-              </a:ext>
-            </a:extLst>
-          </p:cNvPr>
-          <p:cNvSpPr/>
-          <p:nvPr/>
-        </p:nvSpPr>
-        <p:spPr>
-          <a:xfrm>
-            <a:off x="5514679" y="1225463"/>
-            <a:ext cx="1904214" cy="1072299"/>
-          </a:xfrm>
-          <a:prstGeom prst="rect">
-            <a:avLst/>
-          </a:prstGeom>
-        </p:spPr>
-        <p:style>
-          <a:lnRef idx="2">
-            <a:schemeClr val="accent1">
-              <a:shade val="15000"/>
-            </a:schemeClr>
-          </a:lnRef>
-          <a:fillRef idx="1">
-            <a:schemeClr val="accent1"/>
-          </a:fillRef>
-          <a:effectRef idx="0">
-            <a:schemeClr val="accent1"/>
-          </a:effectRef>
-          <a:fontRef idx="minor">
-            <a:schemeClr val="lt1"/>
-          </a:fontRef>
-        </p:style>
-        <p:txBody>
-          <a:bodyPr rtlCol="0" anchor="ctr"/>
-          <a:lstStyle/>
-          <a:p>
-            <a:pPr algn="ctr"/>
-            <a:r>
-              <a:rPr lang="en-GB" dirty="0"/>
-              <a:t>Test Scripting</a:t>
-            </a:r>
-          </a:p>
-        </p:txBody>
-      </p:sp>
-      <p:sp>
-        <p:nvSpPr>
-          <p:cNvPr id="6" name="Rectangle 5">
-            <a:extLst>
-              <a:ext uri="{FF2B5EF4-FFF2-40B4-BE49-F238E27FC236}">
-                <a16:creationId xmlns:a16="http://schemas.microsoft.com/office/drawing/2014/main" id="{14D4F97E-7BFB-B6D7-8D7D-E14AC206F99B}"/>
-              </a:ext>
-            </a:extLst>
-          </p:cNvPr>
-          <p:cNvSpPr/>
-          <p:nvPr/>
-        </p:nvSpPr>
-        <p:spPr>
-          <a:xfrm>
-            <a:off x="9039144" y="1244318"/>
-            <a:ext cx="1904214" cy="1072299"/>
-          </a:xfrm>
-          <a:prstGeom prst="rect">
-            <a:avLst/>
-          </a:prstGeom>
-        </p:spPr>
-        <p:style>
-          <a:lnRef idx="2">
-            <a:schemeClr val="accent1">
-              <a:shade val="15000"/>
-            </a:schemeClr>
-          </a:lnRef>
-          <a:fillRef idx="1">
-            <a:schemeClr val="accent1"/>
-          </a:fillRef>
-          <a:effectRef idx="0">
-            <a:schemeClr val="accent1"/>
-          </a:effectRef>
-          <a:fontRef idx="minor">
-            <a:schemeClr val="lt1"/>
-          </a:fontRef>
-        </p:style>
-        <p:txBody>
-          <a:bodyPr rtlCol="0" anchor="ctr"/>
-          <a:lstStyle/>
-          <a:p>
-            <a:pPr algn="ctr"/>
-            <a:r>
-              <a:rPr lang="en-GB" dirty="0"/>
-              <a:t>Bug reporting</a:t>
-            </a:r>
-          </a:p>
-        </p:txBody>
-      </p:sp>
-      <p:sp>
-        <p:nvSpPr>
-          <p:cNvPr id="7" name="Content Placeholder 2">
-            <a:extLst>
-              <a:ext uri="{FF2B5EF4-FFF2-40B4-BE49-F238E27FC236}">
-                <a16:creationId xmlns:a16="http://schemas.microsoft.com/office/drawing/2014/main" id="{6FB7888D-A37B-E5F5-F64E-32273E59859E}"/>
-              </a:ext>
-            </a:extLst>
-          </p:cNvPr>
-          <p:cNvSpPr>
-            <a:spLocks noGrp="1"/>
-          </p:cNvSpPr>
-          <p:nvPr>
-            <p:ph idx="1"/>
-          </p:nvPr>
-        </p:nvSpPr>
-        <p:spPr>
-          <a:xfrm>
-            <a:off x="1484311" y="2432115"/>
-            <a:ext cx="10006964" cy="3949831"/>
+            <a:off x="1484310" y="1263193"/>
+            <a:ext cx="10018713" cy="5033912"/>
           </a:xfrm>
         </p:spPr>
         <p:txBody>
@@ -7501,169 +7589,490 @@
           </a:bodyPr>
           <a:lstStyle/>
           <a:p>
-            <a:pPr marL="0" indent="0">
-              <a:buNone/>
+            <a:endParaRPr lang="en-GB" sz="1400">
+              <a:latin typeface="Calibri" panose="020F0502020204030204" pitchFamily="34" charset="0"/>
+              <a:ea typeface="Calibri" panose="020F0502020204030204" pitchFamily="34" charset="0"/>
+              <a:cs typeface="Calibri" panose="020F0502020204030204" pitchFamily="34" charset="0"/>
+            </a:endParaRPr>
+          </a:p>
+          <a:p>
+            <a:r>
+              <a:rPr lang="en-GB" sz="1400">
+                <a:latin typeface="Calibri" panose="020F0502020204030204" pitchFamily="34" charset="0"/>
+                <a:ea typeface="Calibri" panose="020F0502020204030204" pitchFamily="34" charset="0"/>
+                <a:cs typeface="Calibri" panose="020F0502020204030204" pitchFamily="34" charset="0"/>
+              </a:rPr>
+              <a:t>The </a:t>
+            </a:r>
+            <a:r>
+              <a:rPr lang="en-GB" sz="1400" dirty="0">
+                <a:latin typeface="Calibri" panose="020F0502020204030204" pitchFamily="34" charset="0"/>
+                <a:ea typeface="Calibri" panose="020F0502020204030204" pitchFamily="34" charset="0"/>
+                <a:cs typeface="Calibri" panose="020F0502020204030204" pitchFamily="34" charset="0"/>
+              </a:rPr>
+              <a:t>Test Strategy aims to define the approach and guidelines for testing the RiskPoint Group website. It ensures that all testing activities align with the project’s objectives, deliverables, and quality standards.</a:t>
+            </a:r>
+          </a:p>
+          <a:p>
+            <a:pPr marL="0" marR="0" algn="just">
+              <a:lnSpc>
+                <a:spcPct val="107000"/>
+              </a:lnSpc>
+              <a:spcBef>
+                <a:spcPts val="0"/>
+              </a:spcBef>
+              <a:spcAft>
+                <a:spcPts val="800"/>
+              </a:spcAft>
             </a:pPr>
-            <a:r>
-              <a:rPr lang="en-GB" sz="1800" b="1" dirty="0">
-                <a:latin typeface="Calibri" panose="020F0502020204030204" pitchFamily="34" charset="0"/>
-                <a:ea typeface="Calibri" panose="020F0502020204030204" pitchFamily="34" charset="0"/>
-                <a:cs typeface="Times New Roman" panose="02020603050405020304" pitchFamily="18" charset="0"/>
-              </a:rPr>
-              <a:t>Define Scenarios</a:t>
-            </a:r>
-            <a:r>
-              <a:rPr lang="da-DK" sz="1800" b="1" dirty="0">
-                <a:latin typeface="Calibri" panose="020F0502020204030204" pitchFamily="34" charset="0"/>
-                <a:ea typeface="Calibri" panose="020F0502020204030204" pitchFamily="34" charset="0"/>
-                <a:cs typeface="Times New Roman" panose="02020603050405020304" pitchFamily="18" charset="0"/>
-              </a:rPr>
-              <a:t>: </a:t>
-            </a:r>
-            <a:r>
-              <a:rPr lang="en-GB" sz="1800" dirty="0">
-                <a:latin typeface="Calibri" panose="020F0502020204030204" pitchFamily="34" charset="0"/>
-                <a:ea typeface="Calibri" panose="020F0502020204030204" pitchFamily="34" charset="0"/>
-                <a:cs typeface="Times New Roman" panose="02020603050405020304" pitchFamily="18" charset="0"/>
-              </a:rPr>
-              <a:t>Scenarios for the RiskPoint Group website are identified based on the understanding of end user.</a:t>
-            </a:r>
-          </a:p>
-          <a:p>
-            <a:pPr marL="0" indent="0">
-              <a:buNone/>
-            </a:pPr>
-            <a:r>
-              <a:rPr lang="en-GB" sz="1800" dirty="0">
-                <a:latin typeface="Calibri" panose="020F0502020204030204" pitchFamily="34" charset="0"/>
-                <a:ea typeface="Calibri" panose="020F0502020204030204" pitchFamily="34" charset="0"/>
-                <a:cs typeface="Times New Roman" panose="02020603050405020304" pitchFamily="18" charset="0"/>
-              </a:rPr>
-              <a:t>These scenarios for the website has been authored using BDD framework using Cucumber, for the easy understanding of test being done on the website (audience such as end-user, testers or stakeholders). Below is the sample snippet of the scenario in BDD framework .</a:t>
-            </a:r>
-          </a:p>
-          <a:p>
-            <a:pPr marL="0" indent="0">
-              <a:buNone/>
-            </a:pPr>
-            <a:r>
-              <a:rPr lang="en-GB" sz="1800" dirty="0">
-                <a:latin typeface="Calibri" panose="020F0502020204030204" pitchFamily="34" charset="0"/>
-                <a:ea typeface="Calibri" panose="020F0502020204030204" pitchFamily="34" charset="0"/>
-                <a:cs typeface="Times New Roman" panose="02020603050405020304" pitchFamily="18" charset="0"/>
-              </a:rPr>
-              <a:t>Feature: Claims</a:t>
-            </a:r>
-          </a:p>
-          <a:p>
-            <a:pPr marL="0" indent="0">
-              <a:buNone/>
-            </a:pPr>
-            <a:r>
-              <a:rPr lang="en-GB" sz="1800">
-                <a:latin typeface="Calibri" panose="020F0502020204030204" pitchFamily="34" charset="0"/>
-                <a:ea typeface="Calibri" panose="020F0502020204030204" pitchFamily="34" charset="0"/>
-                <a:cs typeface="Times New Roman" panose="02020603050405020304" pitchFamily="18" charset="0"/>
-              </a:rPr>
-              <a:t>    </a:t>
-            </a:r>
-            <a:r>
-              <a:rPr lang="en-GB" sz="1800" dirty="0">
-                <a:latin typeface="Calibri" panose="020F0502020204030204" pitchFamily="34" charset="0"/>
-                <a:ea typeface="Calibri" panose="020F0502020204030204" pitchFamily="34" charset="0"/>
-                <a:cs typeface="Times New Roman" panose="02020603050405020304" pitchFamily="18" charset="0"/>
-              </a:rPr>
-              <a:t>Scenario: Verify the Home Page of RiskPoint Group</a:t>
-            </a:r>
-          </a:p>
-          <a:p>
-            <a:pPr marL="0" indent="0">
-              <a:buNone/>
-            </a:pPr>
-            <a:r>
-              <a:rPr lang="en-GB" sz="1800" dirty="0">
-                <a:latin typeface="Calibri" panose="020F0502020204030204" pitchFamily="34" charset="0"/>
-                <a:ea typeface="Calibri" panose="020F0502020204030204" pitchFamily="34" charset="0"/>
-                <a:cs typeface="Times New Roman" panose="02020603050405020304" pitchFamily="18" charset="0"/>
-              </a:rPr>
-              <a:t>        Given I am on the home page of 'rpgroup.com'</a:t>
-            </a:r>
-          </a:p>
-          <a:p>
-            <a:pPr marL="0" indent="0">
-              <a:buNone/>
-            </a:pPr>
-            <a:r>
-              <a:rPr lang="en-GB" sz="1800" dirty="0">
-                <a:latin typeface="Calibri" panose="020F0502020204030204" pitchFamily="34" charset="0"/>
-                <a:ea typeface="Calibri" panose="020F0502020204030204" pitchFamily="34" charset="0"/>
-                <a:cs typeface="Times New Roman" panose="02020603050405020304" pitchFamily="18" charset="0"/>
-              </a:rPr>
-              <a:t>        When On the home page User hovers on Claims tab</a:t>
-            </a:r>
-          </a:p>
-          <a:p>
-            <a:pPr marL="0" indent="0">
-              <a:buNone/>
-            </a:pPr>
-            <a:r>
-              <a:rPr lang="en-GB" sz="1800" dirty="0">
-                <a:latin typeface="Calibri" panose="020F0502020204030204" pitchFamily="34" charset="0"/>
-                <a:ea typeface="Calibri" panose="020F0502020204030204" pitchFamily="34" charset="0"/>
-                <a:cs typeface="Times New Roman" panose="02020603050405020304" pitchFamily="18" charset="0"/>
-              </a:rPr>
-              <a:t>        Then Emergency Contacts section should be displayed</a:t>
-            </a:r>
-          </a:p>
-          <a:p>
-            <a:pPr marL="0" indent="0">
-              <a:buNone/>
-            </a:pPr>
-            <a:r>
-              <a:rPr lang="en-GB" sz="1800" dirty="0">
-                <a:latin typeface="Calibri" panose="020F0502020204030204" pitchFamily="34" charset="0"/>
-                <a:ea typeface="Calibri" panose="020F0502020204030204" pitchFamily="34" charset="0"/>
-                <a:cs typeface="Times New Roman" panose="02020603050405020304" pitchFamily="18" charset="0"/>
-              </a:rPr>
-              <a:t>        And Report a Claim section should be displayed</a:t>
-            </a:r>
-          </a:p>
-          <a:p>
-            <a:pPr marL="0" indent="0">
-              <a:buNone/>
-            </a:pPr>
-            <a:endParaRPr lang="en-GB" sz="1800" dirty="0">
+            <a:endParaRPr lang="en-GB" sz="1800" b="1" kern="100" dirty="0">
+              <a:effectLst/>
               <a:latin typeface="Calibri" panose="020F0502020204030204" pitchFamily="34" charset="0"/>
               <a:ea typeface="Calibri" panose="020F0502020204030204" pitchFamily="34" charset="0"/>
               <a:cs typeface="Times New Roman" panose="02020603050405020304" pitchFamily="18" charset="0"/>
             </a:endParaRPr>
           </a:p>
           <a:p>
-            <a:pPr marL="0" indent="0">
-              <a:buNone/>
+            <a:pPr marL="0" marR="0" algn="just">
+              <a:lnSpc>
+                <a:spcPct val="107000"/>
+              </a:lnSpc>
+              <a:spcBef>
+                <a:spcPts val="0"/>
+              </a:spcBef>
+              <a:spcAft>
+                <a:spcPts val="800"/>
+              </a:spcAft>
             </a:pPr>
-            <a:endParaRPr lang="en-GB" sz="1800" dirty="0">
+            <a:r>
+              <a:rPr lang="en-GB" sz="1800" b="1" kern="100" dirty="0">
+                <a:effectLst/>
+                <a:latin typeface="Calibri" panose="020F0502020204030204" pitchFamily="34" charset="0"/>
+                <a:ea typeface="Calibri" panose="020F0502020204030204" pitchFamily="34" charset="0"/>
+                <a:cs typeface="Times New Roman" panose="02020603050405020304" pitchFamily="18" charset="0"/>
+              </a:rPr>
+              <a:t>Types of Testing:</a:t>
+            </a:r>
+            <a:endParaRPr lang="en-GB" sz="1800" kern="100" dirty="0">
+              <a:effectLst/>
               <a:latin typeface="Calibri" panose="020F0502020204030204" pitchFamily="34" charset="0"/>
               <a:ea typeface="Calibri" panose="020F0502020204030204" pitchFamily="34" charset="0"/>
               <a:cs typeface="Times New Roman" panose="02020603050405020304" pitchFamily="18" charset="0"/>
             </a:endParaRPr>
           </a:p>
           <a:p>
-            <a:pPr marL="0" indent="0">
-              <a:buNone/>
+            <a:pPr marL="800100" lvl="1" indent="-342900" algn="just">
+              <a:lnSpc>
+                <a:spcPct val="107000"/>
+              </a:lnSpc>
+              <a:spcBef>
+                <a:spcPts val="0"/>
+              </a:spcBef>
+              <a:spcAft>
+                <a:spcPts val="800"/>
+              </a:spcAft>
+              <a:buSzPts val="1000"/>
+              <a:buFont typeface="Symbol" panose="05050102010706020507" pitchFamily="18" charset="2"/>
+              <a:buChar char=""/>
+              <a:tabLst>
+                <a:tab pos="457200" algn="l"/>
+              </a:tabLst>
             </a:pPr>
-            <a:endParaRPr lang="en-GB" sz="1800" dirty="0">
+            <a:r>
+              <a:rPr lang="en-GB" sz="1400" b="1" kern="100" dirty="0">
+                <a:effectLst/>
+                <a:latin typeface="Calibri" panose="020F0502020204030204" pitchFamily="34" charset="0"/>
+                <a:ea typeface="Calibri" panose="020F0502020204030204" pitchFamily="34" charset="0"/>
+                <a:cs typeface="Times New Roman" panose="02020603050405020304" pitchFamily="18" charset="0"/>
+              </a:rPr>
+              <a:t>Functional Testing:</a:t>
+            </a:r>
+            <a:r>
+              <a:rPr lang="en-GB" sz="1400" kern="100" dirty="0">
+                <a:effectLst/>
+                <a:latin typeface="Calibri" panose="020F0502020204030204" pitchFamily="34" charset="0"/>
+                <a:ea typeface="Calibri" panose="020F0502020204030204" pitchFamily="34" charset="0"/>
+                <a:cs typeface="Times New Roman" panose="02020603050405020304" pitchFamily="18" charset="0"/>
+              </a:rPr>
+              <a:t> Validate that the website works as expected according to the requirements.</a:t>
+            </a:r>
+          </a:p>
+          <a:p>
+            <a:pPr marL="800100" lvl="1" indent="-342900" algn="just">
+              <a:lnSpc>
+                <a:spcPct val="107000"/>
+              </a:lnSpc>
+              <a:spcBef>
+                <a:spcPts val="0"/>
+              </a:spcBef>
+              <a:spcAft>
+                <a:spcPts val="800"/>
+              </a:spcAft>
+              <a:buSzPts val="1000"/>
+              <a:buFont typeface="Symbol" panose="05050102010706020507" pitchFamily="18" charset="2"/>
+              <a:buChar char=""/>
+              <a:tabLst>
+                <a:tab pos="457200" algn="l"/>
+              </a:tabLst>
+            </a:pPr>
+            <a:r>
+              <a:rPr lang="en-GB" sz="1400" b="1" kern="100" dirty="0">
+                <a:effectLst/>
+                <a:latin typeface="Calibri" panose="020F0502020204030204" pitchFamily="34" charset="0"/>
+                <a:ea typeface="Calibri" panose="020F0502020204030204" pitchFamily="34" charset="0"/>
+                <a:cs typeface="Times New Roman" panose="02020603050405020304" pitchFamily="18" charset="0"/>
+              </a:rPr>
+              <a:t>UI/UX Testing:</a:t>
+            </a:r>
+            <a:r>
+              <a:rPr lang="en-GB" sz="1400" kern="100" dirty="0">
+                <a:effectLst/>
+                <a:latin typeface="Calibri" panose="020F0502020204030204" pitchFamily="34" charset="0"/>
+                <a:ea typeface="Calibri" panose="020F0502020204030204" pitchFamily="34" charset="0"/>
+                <a:cs typeface="Times New Roman" panose="02020603050405020304" pitchFamily="18" charset="0"/>
+              </a:rPr>
+              <a:t> Ensure the user interface is intuitive and provides a positive user experience. </a:t>
+            </a:r>
+          </a:p>
+          <a:p>
+            <a:pPr marL="800100" lvl="1" indent="-342900" algn="just">
+              <a:lnSpc>
+                <a:spcPct val="107000"/>
+              </a:lnSpc>
+              <a:spcBef>
+                <a:spcPts val="0"/>
+              </a:spcBef>
+              <a:spcAft>
+                <a:spcPts val="800"/>
+              </a:spcAft>
+              <a:buSzPts val="1000"/>
+              <a:buFont typeface="Symbol" panose="05050102010706020507" pitchFamily="18" charset="2"/>
+              <a:buChar char=""/>
+              <a:tabLst>
+                <a:tab pos="457200" algn="l"/>
+              </a:tabLst>
+            </a:pPr>
+            <a:r>
+              <a:rPr lang="en-GB" sz="1400" b="1" kern="100" dirty="0">
+                <a:effectLst/>
+                <a:latin typeface="Calibri" panose="020F0502020204030204" pitchFamily="34" charset="0"/>
+                <a:ea typeface="Calibri" panose="020F0502020204030204" pitchFamily="34" charset="0"/>
+                <a:cs typeface="Times New Roman" panose="02020603050405020304" pitchFamily="18" charset="0"/>
+              </a:rPr>
+              <a:t>Regression Testing:</a:t>
+            </a:r>
+            <a:r>
+              <a:rPr lang="en-GB" sz="1400" kern="100" dirty="0">
+                <a:effectLst/>
+                <a:latin typeface="Calibri" panose="020F0502020204030204" pitchFamily="34" charset="0"/>
+                <a:ea typeface="Calibri" panose="020F0502020204030204" pitchFamily="34" charset="0"/>
+                <a:cs typeface="Times New Roman" panose="02020603050405020304" pitchFamily="18" charset="0"/>
+              </a:rPr>
+              <a:t> Ensure that changes and updates do not affect existing functionality.</a:t>
+            </a:r>
+          </a:p>
+          <a:p>
+            <a:pPr marL="0" marR="0" algn="just">
+              <a:lnSpc>
+                <a:spcPct val="107000"/>
+              </a:lnSpc>
+              <a:spcBef>
+                <a:spcPts val="0"/>
+              </a:spcBef>
+              <a:spcAft>
+                <a:spcPts val="800"/>
+              </a:spcAft>
+            </a:pPr>
+            <a:r>
+              <a:rPr lang="en-GB" sz="1800" b="1" kern="100" dirty="0">
+                <a:effectLst/>
+                <a:latin typeface="Calibri" panose="020F0502020204030204" pitchFamily="34" charset="0"/>
+                <a:ea typeface="Calibri" panose="020F0502020204030204" pitchFamily="34" charset="0"/>
+                <a:cs typeface="Times New Roman" panose="02020603050405020304" pitchFamily="18" charset="0"/>
+              </a:rPr>
+              <a:t>Testing Levels:</a:t>
+            </a:r>
+            <a:endParaRPr lang="en-GB" sz="1800" kern="100" dirty="0">
+              <a:effectLst/>
               <a:latin typeface="Calibri" panose="020F0502020204030204" pitchFamily="34" charset="0"/>
               <a:ea typeface="Calibri" panose="020F0502020204030204" pitchFamily="34" charset="0"/>
               <a:cs typeface="Times New Roman" panose="02020603050405020304" pitchFamily="18" charset="0"/>
             </a:endParaRPr>
           </a:p>
+          <a:p>
+            <a:pPr marL="800100" lvl="1" indent="-342900" algn="just">
+              <a:lnSpc>
+                <a:spcPct val="107000"/>
+              </a:lnSpc>
+              <a:spcBef>
+                <a:spcPts val="0"/>
+              </a:spcBef>
+              <a:spcAft>
+                <a:spcPts val="800"/>
+              </a:spcAft>
+              <a:buSzPts val="1000"/>
+              <a:buFont typeface="Symbol" panose="05050102010706020507" pitchFamily="18" charset="2"/>
+              <a:buChar char=""/>
+              <a:tabLst>
+                <a:tab pos="457200" algn="l"/>
+              </a:tabLst>
+            </a:pPr>
+            <a:r>
+              <a:rPr lang="en-GB" sz="1400" b="1" kern="100" dirty="0">
+                <a:effectLst/>
+                <a:latin typeface="Calibri" panose="020F0502020204030204" pitchFamily="34" charset="0"/>
+                <a:ea typeface="Calibri" panose="020F0502020204030204" pitchFamily="34" charset="0"/>
+                <a:cs typeface="Times New Roman" panose="02020603050405020304" pitchFamily="18" charset="0"/>
+              </a:rPr>
+              <a:t>Integration Testing:</a:t>
+            </a:r>
+            <a:r>
+              <a:rPr lang="en-GB" sz="1400" kern="100" dirty="0">
+                <a:effectLst/>
+                <a:latin typeface="Calibri" panose="020F0502020204030204" pitchFamily="34" charset="0"/>
+                <a:ea typeface="Calibri" panose="020F0502020204030204" pitchFamily="34" charset="0"/>
+                <a:cs typeface="Times New Roman" panose="02020603050405020304" pitchFamily="18" charset="0"/>
+              </a:rPr>
+              <a:t> Test the interaction between different modules or components.</a:t>
+            </a:r>
+          </a:p>
+          <a:p>
+            <a:pPr marL="800100" lvl="1" indent="-342900" algn="just">
+              <a:lnSpc>
+                <a:spcPct val="107000"/>
+              </a:lnSpc>
+              <a:spcBef>
+                <a:spcPts val="0"/>
+              </a:spcBef>
+              <a:spcAft>
+                <a:spcPts val="800"/>
+              </a:spcAft>
+              <a:buSzPts val="1000"/>
+              <a:buFont typeface="Symbol" panose="05050102010706020507" pitchFamily="18" charset="2"/>
+              <a:buChar char=""/>
+              <a:tabLst>
+                <a:tab pos="457200" algn="l"/>
+              </a:tabLst>
+            </a:pPr>
+            <a:r>
+              <a:rPr lang="en-GB" sz="1400" b="1" kern="100" dirty="0">
+                <a:effectLst/>
+                <a:latin typeface="Calibri" panose="020F0502020204030204" pitchFamily="34" charset="0"/>
+                <a:ea typeface="Calibri" panose="020F0502020204030204" pitchFamily="34" charset="0"/>
+                <a:cs typeface="Times New Roman" panose="02020603050405020304" pitchFamily="18" charset="0"/>
+              </a:rPr>
+              <a:t>System Testing:</a:t>
+            </a:r>
+            <a:r>
+              <a:rPr lang="en-GB" sz="1400" kern="100" dirty="0">
+                <a:effectLst/>
+                <a:latin typeface="Calibri" panose="020F0502020204030204" pitchFamily="34" charset="0"/>
+                <a:ea typeface="Calibri" panose="020F0502020204030204" pitchFamily="34" charset="0"/>
+                <a:cs typeface="Times New Roman" panose="02020603050405020304" pitchFamily="18" charset="0"/>
+              </a:rPr>
+              <a:t> Validate the complete functionality of the website as a whole.</a:t>
+            </a:r>
+          </a:p>
+          <a:p>
+            <a:pPr marL="0" marR="0" algn="just">
+              <a:lnSpc>
+                <a:spcPct val="107000"/>
+              </a:lnSpc>
+              <a:spcBef>
+                <a:spcPts val="0"/>
+              </a:spcBef>
+              <a:spcAft>
+                <a:spcPts val="800"/>
+              </a:spcAft>
+            </a:pPr>
+            <a:r>
+              <a:rPr lang="en-GB" sz="1800" b="1" kern="100" dirty="0">
+                <a:effectLst/>
+                <a:latin typeface="Calibri" panose="020F0502020204030204" pitchFamily="34" charset="0"/>
+                <a:ea typeface="Calibri" panose="020F0502020204030204" pitchFamily="34" charset="0"/>
+                <a:cs typeface="Times New Roman" panose="02020603050405020304" pitchFamily="18" charset="0"/>
+              </a:rPr>
+              <a:t>Test Approach:</a:t>
+            </a:r>
+            <a:endParaRPr lang="en-GB" sz="1800" kern="100" dirty="0">
+              <a:effectLst/>
+              <a:latin typeface="Calibri" panose="020F0502020204030204" pitchFamily="34" charset="0"/>
+              <a:ea typeface="Calibri" panose="020F0502020204030204" pitchFamily="34" charset="0"/>
+              <a:cs typeface="Times New Roman" panose="02020603050405020304" pitchFamily="18" charset="0"/>
+            </a:endParaRPr>
+          </a:p>
+          <a:p>
+            <a:pPr marL="800100" lvl="1" indent="-342900" algn="just">
+              <a:lnSpc>
+                <a:spcPct val="107000"/>
+              </a:lnSpc>
+              <a:spcBef>
+                <a:spcPts val="0"/>
+              </a:spcBef>
+              <a:spcAft>
+                <a:spcPts val="800"/>
+              </a:spcAft>
+              <a:buSzPts val="1000"/>
+              <a:buFont typeface="Symbol" panose="05050102010706020507" pitchFamily="18" charset="2"/>
+              <a:buChar char=""/>
+              <a:tabLst>
+                <a:tab pos="457200" algn="l"/>
+              </a:tabLst>
+            </a:pPr>
+            <a:r>
+              <a:rPr lang="en-GB" sz="1400" b="1" kern="100" dirty="0">
+                <a:effectLst/>
+                <a:latin typeface="Calibri" panose="020F0502020204030204" pitchFamily="34" charset="0"/>
+                <a:ea typeface="Calibri" panose="020F0502020204030204" pitchFamily="34" charset="0"/>
+                <a:cs typeface="Times New Roman" panose="02020603050405020304" pitchFamily="18" charset="0"/>
+              </a:rPr>
+              <a:t>Manual Testing:</a:t>
+            </a:r>
+            <a:r>
+              <a:rPr lang="en-GB" sz="1400" kern="100" dirty="0">
+                <a:effectLst/>
+                <a:latin typeface="Calibri" panose="020F0502020204030204" pitchFamily="34" charset="0"/>
+                <a:ea typeface="Calibri" panose="020F0502020204030204" pitchFamily="34" charset="0"/>
+                <a:cs typeface="Times New Roman" panose="02020603050405020304" pitchFamily="18" charset="0"/>
+              </a:rPr>
+              <a:t> Used for UI/UX, content verification, and exploratory testing.</a:t>
+            </a:r>
+          </a:p>
+          <a:p>
+            <a:pPr marL="800100" lvl="1" indent="-342900" algn="just">
+              <a:lnSpc>
+                <a:spcPct val="107000"/>
+              </a:lnSpc>
+              <a:spcBef>
+                <a:spcPts val="0"/>
+              </a:spcBef>
+              <a:spcAft>
+                <a:spcPts val="800"/>
+              </a:spcAft>
+              <a:buSzPts val="1000"/>
+              <a:buFont typeface="Symbol" panose="05050102010706020507" pitchFamily="18" charset="2"/>
+              <a:buChar char=""/>
+              <a:tabLst>
+                <a:tab pos="457200" algn="l"/>
+              </a:tabLst>
+            </a:pPr>
+            <a:r>
+              <a:rPr lang="en-GB" sz="1400" b="1" kern="100" dirty="0">
+                <a:effectLst/>
+                <a:latin typeface="Calibri" panose="020F0502020204030204" pitchFamily="34" charset="0"/>
+                <a:ea typeface="Calibri" panose="020F0502020204030204" pitchFamily="34" charset="0"/>
+                <a:cs typeface="Times New Roman" panose="02020603050405020304" pitchFamily="18" charset="0"/>
+              </a:rPr>
+              <a:t>Automated Testing:</a:t>
+            </a:r>
+            <a:r>
+              <a:rPr lang="en-GB" sz="1400" kern="100" dirty="0">
+                <a:effectLst/>
+                <a:latin typeface="Calibri" panose="020F0502020204030204" pitchFamily="34" charset="0"/>
+                <a:ea typeface="Calibri" panose="020F0502020204030204" pitchFamily="34" charset="0"/>
+                <a:cs typeface="Times New Roman" panose="02020603050405020304" pitchFamily="18" charset="0"/>
+              </a:rPr>
+              <a:t> Implemented for regression testing, performance testing, and repeated functional tests.</a:t>
+            </a:r>
+          </a:p>
+          <a:p>
+            <a:pPr marL="800100" lvl="1" indent="-342900" algn="just">
+              <a:lnSpc>
+                <a:spcPct val="107000"/>
+              </a:lnSpc>
+              <a:spcBef>
+                <a:spcPts val="0"/>
+              </a:spcBef>
+              <a:spcAft>
+                <a:spcPts val="800"/>
+              </a:spcAft>
+              <a:buSzPts val="1000"/>
+              <a:buFont typeface="Symbol" panose="05050102010706020507" pitchFamily="18" charset="2"/>
+              <a:buChar char=""/>
+              <a:tabLst>
+                <a:tab pos="457200" algn="l"/>
+              </a:tabLst>
+            </a:pPr>
+            <a:r>
+              <a:rPr lang="en-GB" sz="1400" b="1" kern="100" dirty="0">
+                <a:effectLst/>
+                <a:latin typeface="Calibri" panose="020F0502020204030204" pitchFamily="34" charset="0"/>
+                <a:ea typeface="Calibri" panose="020F0502020204030204" pitchFamily="34" charset="0"/>
+                <a:cs typeface="Times New Roman" panose="02020603050405020304" pitchFamily="18" charset="0"/>
+              </a:rPr>
+              <a:t>Test Environment:</a:t>
+            </a:r>
+            <a:r>
+              <a:rPr lang="en-GB" sz="1400" kern="100" dirty="0">
+                <a:effectLst/>
+                <a:latin typeface="Calibri" panose="020F0502020204030204" pitchFamily="34" charset="0"/>
+                <a:ea typeface="Calibri" panose="020F0502020204030204" pitchFamily="34" charset="0"/>
+                <a:cs typeface="Times New Roman" panose="02020603050405020304" pitchFamily="18" charset="0"/>
+              </a:rPr>
+              <a:t> The test environment will closely resemble the production environment, including servers, databases, and network settings.</a:t>
+            </a:r>
+          </a:p>
+          <a:p>
+            <a:pPr marL="457200" lvl="1" indent="0" algn="just">
+              <a:lnSpc>
+                <a:spcPct val="107000"/>
+              </a:lnSpc>
+              <a:spcBef>
+                <a:spcPts val="0"/>
+              </a:spcBef>
+              <a:spcAft>
+                <a:spcPts val="800"/>
+              </a:spcAft>
+              <a:buSzPts val="1000"/>
+              <a:buNone/>
+              <a:tabLst>
+                <a:tab pos="457200" algn="l"/>
+              </a:tabLst>
+            </a:pPr>
+            <a:endParaRPr lang="en-GB" sz="1400" kern="100" dirty="0">
+              <a:effectLst/>
+              <a:latin typeface="Calibri" panose="020F0502020204030204" pitchFamily="34" charset="0"/>
+              <a:ea typeface="Calibri" panose="020F0502020204030204" pitchFamily="34" charset="0"/>
+              <a:cs typeface="Times New Roman" panose="02020603050405020304" pitchFamily="18" charset="0"/>
+            </a:endParaRPr>
+          </a:p>
+          <a:p>
+            <a:pPr marL="457200" lvl="1" indent="0" algn="just">
+              <a:lnSpc>
+                <a:spcPct val="107000"/>
+              </a:lnSpc>
+              <a:spcBef>
+                <a:spcPts val="0"/>
+              </a:spcBef>
+              <a:spcAft>
+                <a:spcPts val="800"/>
+              </a:spcAft>
+              <a:buSzPts val="1000"/>
+              <a:buNone/>
+              <a:tabLst>
+                <a:tab pos="457200" algn="l"/>
+              </a:tabLst>
+            </a:pPr>
+            <a:endParaRPr lang="en-GB" sz="1400" kern="100" dirty="0">
+              <a:effectLst/>
+              <a:latin typeface="Calibri" panose="020F0502020204030204" pitchFamily="34" charset="0"/>
+              <a:ea typeface="Calibri" panose="020F0502020204030204" pitchFamily="34" charset="0"/>
+              <a:cs typeface="Times New Roman" panose="02020603050405020304" pitchFamily="18" charset="0"/>
+            </a:endParaRPr>
+          </a:p>
+          <a:p>
+            <a:endParaRPr lang="en-GB" sz="1400" dirty="0">
+              <a:latin typeface="Calibri" panose="020F0502020204030204" pitchFamily="34" charset="0"/>
+              <a:ea typeface="Calibri" panose="020F0502020204030204" pitchFamily="34" charset="0"/>
+              <a:cs typeface="Calibri" panose="020F0502020204030204" pitchFamily="34" charset="0"/>
+            </a:endParaRPr>
+          </a:p>
         </p:txBody>
       </p:sp>
     </p:spTree>
     <p:extLst>
       <p:ext uri="{BB962C8B-B14F-4D97-AF65-F5344CB8AC3E}">
-        <p14:creationId xmlns:p14="http://schemas.microsoft.com/office/powerpoint/2010/main" val="2354998779"/>
+        <p14:creationId xmlns:p14="http://schemas.microsoft.com/office/powerpoint/2010/main" val="3576951177"/>
       </p:ext>
     </p:extLst>
   </p:cSld>
@@ -7695,7 +8104,7 @@
           <p:cNvPr id="2" name="Title 1">
             <a:extLst>
               <a:ext uri="{FF2B5EF4-FFF2-40B4-BE49-F238E27FC236}">
-                <a16:creationId xmlns:a16="http://schemas.microsoft.com/office/drawing/2014/main" id="{89237210-2C33-57A8-F271-9DBAE07A53DD}"/>
+                <a16:creationId xmlns:a16="http://schemas.microsoft.com/office/drawing/2014/main" id="{6EB53A5F-7FFF-7D0F-6D73-9374016F3FCD}"/>
               </a:ext>
             </a:extLst>
           </p:cNvPr>
@@ -7706,27 +8115,179 @@
             <p:ph type="title"/>
           </p:nvPr>
         </p:nvSpPr>
-        <p:spPr/>
+        <p:spPr>
+          <a:xfrm>
+            <a:off x="1484311" y="157893"/>
+            <a:ext cx="10506584" cy="709373"/>
+          </a:xfrm>
+        </p:spPr>
         <p:txBody>
           <a:bodyPr/>
           <a:lstStyle/>
           <a:p>
             <a:r>
               <a:rPr lang="en-GB" dirty="0"/>
-              <a:t>Bug Report</a:t>
-            </a:r>
-          </a:p>
-        </p:txBody>
-      </p:sp>
-      <p:sp>
-        <p:nvSpPr>
-          <p:cNvPr id="3" name="Content Placeholder 2">
+              <a:t>Test Execution</a:t>
+            </a:r>
+          </a:p>
+        </p:txBody>
+      </p:sp>
+      <p:sp>
+        <p:nvSpPr>
+          <p:cNvPr id="4" name="Rectangle 3">
             <a:extLst>
               <a:ext uri="{FF2B5EF4-FFF2-40B4-BE49-F238E27FC236}">
-                <a16:creationId xmlns:a16="http://schemas.microsoft.com/office/drawing/2014/main" id="{27F2422E-876A-1CA5-F741-5863A5D39398}"/>
+                <a16:creationId xmlns:a16="http://schemas.microsoft.com/office/drawing/2014/main" id="{BB3617FA-871B-1A43-E891-137B4D004C45}"/>
               </a:ext>
             </a:extLst>
           </p:cNvPr>
+          <p:cNvSpPr/>
+          <p:nvPr/>
+        </p:nvSpPr>
+        <p:spPr>
+          <a:xfrm>
+            <a:off x="1995341" y="1121769"/>
+            <a:ext cx="1904214" cy="1072299"/>
+          </a:xfrm>
+          <a:prstGeom prst="rect">
+            <a:avLst/>
+          </a:prstGeom>
+        </p:spPr>
+        <p:style>
+          <a:lnRef idx="2">
+            <a:schemeClr val="accent1">
+              <a:shade val="15000"/>
+            </a:schemeClr>
+          </a:lnRef>
+          <a:fillRef idx="1">
+            <a:schemeClr val="accent1"/>
+          </a:fillRef>
+          <a:effectRef idx="0">
+            <a:schemeClr val="accent1"/>
+          </a:effectRef>
+          <a:fontRef idx="minor">
+            <a:schemeClr val="lt1"/>
+          </a:fontRef>
+        </p:style>
+        <p:txBody>
+          <a:bodyPr rtlCol="0" anchor="ctr"/>
+          <a:lstStyle/>
+          <a:p>
+            <a:pPr algn="ctr"/>
+            <a:r>
+              <a:rPr lang="en-GB" dirty="0"/>
+              <a:t>Define Scenarios</a:t>
+            </a:r>
+          </a:p>
+        </p:txBody>
+      </p:sp>
+      <p:sp>
+        <p:nvSpPr>
+          <p:cNvPr id="5" name="Rectangle 4">
+            <a:extLst>
+              <a:ext uri="{FF2B5EF4-FFF2-40B4-BE49-F238E27FC236}">
+                <a16:creationId xmlns:a16="http://schemas.microsoft.com/office/drawing/2014/main" id="{CF143FBA-5732-84FA-E03E-BAF2B9B4608E}"/>
+              </a:ext>
+            </a:extLst>
+          </p:cNvPr>
+          <p:cNvSpPr/>
+          <p:nvPr/>
+        </p:nvSpPr>
+        <p:spPr>
+          <a:xfrm>
+            <a:off x="5514679" y="1121766"/>
+            <a:ext cx="1904214" cy="1072299"/>
+          </a:xfrm>
+          <a:prstGeom prst="rect">
+            <a:avLst/>
+          </a:prstGeom>
+        </p:spPr>
+        <p:style>
+          <a:lnRef idx="2">
+            <a:schemeClr val="accent1">
+              <a:shade val="15000"/>
+            </a:schemeClr>
+          </a:lnRef>
+          <a:fillRef idx="1">
+            <a:schemeClr val="accent1"/>
+          </a:fillRef>
+          <a:effectRef idx="0">
+            <a:schemeClr val="accent1"/>
+          </a:effectRef>
+          <a:fontRef idx="minor">
+            <a:schemeClr val="lt1"/>
+          </a:fontRef>
+        </p:style>
+        <p:txBody>
+          <a:bodyPr rtlCol="0" anchor="ctr"/>
+          <a:lstStyle/>
+          <a:p>
+            <a:pPr algn="ctr"/>
+            <a:r>
+              <a:rPr lang="en-GB" dirty="0"/>
+              <a:t>Test Scripting</a:t>
+            </a:r>
+          </a:p>
+        </p:txBody>
+      </p:sp>
+      <p:sp>
+        <p:nvSpPr>
+          <p:cNvPr id="6" name="Rectangle 5">
+            <a:extLst>
+              <a:ext uri="{FF2B5EF4-FFF2-40B4-BE49-F238E27FC236}">
+                <a16:creationId xmlns:a16="http://schemas.microsoft.com/office/drawing/2014/main" id="{14D4F97E-7BFB-B6D7-8D7D-E14AC206F99B}"/>
+              </a:ext>
+            </a:extLst>
+          </p:cNvPr>
+          <p:cNvSpPr/>
+          <p:nvPr/>
+        </p:nvSpPr>
+        <p:spPr>
+          <a:xfrm>
+            <a:off x="9039144" y="1140621"/>
+            <a:ext cx="1904214" cy="1072299"/>
+          </a:xfrm>
+          <a:prstGeom prst="rect">
+            <a:avLst/>
+          </a:prstGeom>
+        </p:spPr>
+        <p:style>
+          <a:lnRef idx="2">
+            <a:schemeClr val="accent1">
+              <a:shade val="15000"/>
+            </a:schemeClr>
+          </a:lnRef>
+          <a:fillRef idx="1">
+            <a:schemeClr val="accent1"/>
+          </a:fillRef>
+          <a:effectRef idx="0">
+            <a:schemeClr val="accent1"/>
+          </a:effectRef>
+          <a:fontRef idx="minor">
+            <a:schemeClr val="lt1"/>
+          </a:fontRef>
+        </p:style>
+        <p:txBody>
+          <a:bodyPr rtlCol="0" anchor="ctr"/>
+          <a:lstStyle/>
+          <a:p>
+            <a:pPr algn="ctr"/>
+            <a:r>
+              <a:rPr lang="en-GB" dirty="0"/>
+              <a:t>Bug reporting</a:t>
+            </a:r>
+          </a:p>
+        </p:txBody>
+      </p:sp>
+      <p:sp>
+        <p:nvSpPr>
+          <p:cNvPr id="7" name="Content Placeholder 2">
+            <a:extLst>
+              <a:ext uri="{FF2B5EF4-FFF2-40B4-BE49-F238E27FC236}">
+                <a16:creationId xmlns:a16="http://schemas.microsoft.com/office/drawing/2014/main" id="{6FB7888D-A37B-E5F5-F64E-32273E59859E}"/>
+              </a:ext>
+            </a:extLst>
+          </p:cNvPr>
           <p:cNvSpPr>
             <a:spLocks noGrp="1"/>
           </p:cNvSpPr>
@@ -7734,19 +8295,300 @@
             <p:ph idx="1"/>
           </p:nvPr>
         </p:nvSpPr>
-        <p:spPr/>
-        <p:txBody>
-          <a:bodyPr/>
+        <p:spPr>
+          <a:xfrm>
+            <a:off x="1484311" y="2432115"/>
+            <a:ext cx="10006964" cy="3949831"/>
+          </a:xfrm>
+        </p:spPr>
+        <p:txBody>
+          <a:bodyPr anchor="t">
+            <a:noAutofit/>
+          </a:bodyPr>
           <a:lstStyle/>
           <a:p>
-            <a:endParaRPr lang="en-GB"/>
+            <a:pPr marL="0" indent="0">
+              <a:buNone/>
+            </a:pPr>
+            <a:r>
+              <a:rPr lang="en-GB" sz="1400" b="1" dirty="0">
+                <a:latin typeface="Calibri" panose="020F0502020204030204" pitchFamily="34" charset="0"/>
+                <a:ea typeface="Calibri" panose="020F0502020204030204" pitchFamily="34" charset="0"/>
+                <a:cs typeface="Times New Roman" panose="02020603050405020304" pitchFamily="18" charset="0"/>
+              </a:rPr>
+              <a:t>Define Scenarios</a:t>
+            </a:r>
+            <a:r>
+              <a:rPr lang="da-DK" sz="1400" b="1" dirty="0">
+                <a:latin typeface="Calibri" panose="020F0502020204030204" pitchFamily="34" charset="0"/>
+                <a:ea typeface="Calibri" panose="020F0502020204030204" pitchFamily="34" charset="0"/>
+                <a:cs typeface="Times New Roman" panose="02020603050405020304" pitchFamily="18" charset="0"/>
+              </a:rPr>
+              <a:t>: </a:t>
+            </a:r>
+            <a:r>
+              <a:rPr lang="en-GB" sz="1400" dirty="0">
+                <a:latin typeface="Calibri" panose="020F0502020204030204" pitchFamily="34" charset="0"/>
+                <a:ea typeface="Calibri" panose="020F0502020204030204" pitchFamily="34" charset="0"/>
+                <a:cs typeface="Times New Roman" panose="02020603050405020304" pitchFamily="18" charset="0"/>
+              </a:rPr>
+              <a:t>Defining scenarios is a critical part of testing, user experience design, and requirement analysis. Scenarios describe specific situations or use cases that help in understanding how a system or application should behave in a particular context.</a:t>
+            </a:r>
+            <a:r>
+              <a:rPr lang="da-DK" sz="1400" dirty="0">
+                <a:latin typeface="Calibri" panose="020F0502020204030204" pitchFamily="34" charset="0"/>
+                <a:ea typeface="Calibri" panose="020F0502020204030204" pitchFamily="34" charset="0"/>
+                <a:cs typeface="Times New Roman" panose="02020603050405020304" pitchFamily="18" charset="0"/>
+              </a:rPr>
+              <a:t> </a:t>
+            </a:r>
+          </a:p>
+          <a:p>
+            <a:pPr marL="0" indent="0">
+              <a:buNone/>
+            </a:pPr>
+            <a:r>
+              <a:rPr lang="da-DK" sz="1400" dirty="0">
+                <a:latin typeface="Calibri" panose="020F0502020204030204" pitchFamily="34" charset="0"/>
+                <a:ea typeface="Calibri" panose="020F0502020204030204" pitchFamily="34" charset="0"/>
+                <a:cs typeface="Times New Roman" panose="02020603050405020304" pitchFamily="18" charset="0"/>
+              </a:rPr>
+              <a:t>Steps </a:t>
+            </a:r>
+            <a:r>
+              <a:rPr lang="da-DK" sz="1400" dirty="0" err="1">
+                <a:latin typeface="Calibri" panose="020F0502020204030204" pitchFamily="34" charset="0"/>
+                <a:ea typeface="Calibri" panose="020F0502020204030204" pitchFamily="34" charset="0"/>
+                <a:cs typeface="Times New Roman" panose="02020603050405020304" pitchFamily="18" charset="0"/>
+              </a:rPr>
+              <a:t>considered</a:t>
+            </a:r>
+            <a:r>
+              <a:rPr lang="da-DK" sz="1400" dirty="0">
+                <a:latin typeface="Calibri" panose="020F0502020204030204" pitchFamily="34" charset="0"/>
+                <a:ea typeface="Calibri" panose="020F0502020204030204" pitchFamily="34" charset="0"/>
+                <a:cs typeface="Times New Roman" panose="02020603050405020304" pitchFamily="18" charset="0"/>
+              </a:rPr>
+              <a:t> to </a:t>
+            </a:r>
+            <a:r>
+              <a:rPr lang="da-DK" sz="1400" dirty="0" err="1">
+                <a:latin typeface="Calibri" panose="020F0502020204030204" pitchFamily="34" charset="0"/>
+                <a:ea typeface="Calibri" panose="020F0502020204030204" pitchFamily="34" charset="0"/>
+                <a:cs typeface="Times New Roman" panose="02020603050405020304" pitchFamily="18" charset="0"/>
+              </a:rPr>
+              <a:t>define</a:t>
+            </a:r>
+            <a:r>
+              <a:rPr lang="da-DK" sz="1400" dirty="0">
+                <a:latin typeface="Calibri" panose="020F0502020204030204" pitchFamily="34" charset="0"/>
+                <a:ea typeface="Calibri" panose="020F0502020204030204" pitchFamily="34" charset="0"/>
+                <a:cs typeface="Times New Roman" panose="02020603050405020304" pitchFamily="18" charset="0"/>
+              </a:rPr>
+              <a:t> th scenarios</a:t>
+            </a:r>
+          </a:p>
+          <a:p>
+            <a:pPr marL="0" indent="0">
+              <a:buNone/>
+            </a:pPr>
+            <a:r>
+              <a:rPr lang="da-DK" sz="1400" dirty="0">
+                <a:latin typeface="Calibri" panose="020F0502020204030204" pitchFamily="34" charset="0"/>
+                <a:ea typeface="Calibri" panose="020F0502020204030204" pitchFamily="34" charset="0"/>
+                <a:cs typeface="Times New Roman" panose="02020603050405020304" pitchFamily="18" charset="0"/>
+              </a:rPr>
+              <a:t>	Understand the purpose</a:t>
+            </a:r>
+          </a:p>
+          <a:p>
+            <a:pPr marL="0" indent="0">
+              <a:buNone/>
+            </a:pPr>
+            <a:r>
+              <a:rPr lang="da-DK" sz="1400" dirty="0">
+                <a:latin typeface="Calibri" panose="020F0502020204030204" pitchFamily="34" charset="0"/>
+                <a:ea typeface="Calibri" panose="020F0502020204030204" pitchFamily="34" charset="0"/>
+                <a:cs typeface="Times New Roman" panose="02020603050405020304" pitchFamily="18" charset="0"/>
+              </a:rPr>
+              <a:t>	</a:t>
+            </a:r>
+            <a:r>
+              <a:rPr lang="da-DK" sz="1400" dirty="0" err="1">
+                <a:latin typeface="Calibri" panose="020F0502020204030204" pitchFamily="34" charset="0"/>
+                <a:ea typeface="Calibri" panose="020F0502020204030204" pitchFamily="34" charset="0"/>
+                <a:cs typeface="Times New Roman" panose="02020603050405020304" pitchFamily="18" charset="0"/>
+              </a:rPr>
+              <a:t>Gather</a:t>
+            </a:r>
+            <a:r>
+              <a:rPr lang="da-DK" sz="1400" dirty="0">
+                <a:latin typeface="Calibri" panose="020F0502020204030204" pitchFamily="34" charset="0"/>
+                <a:ea typeface="Calibri" panose="020F0502020204030204" pitchFamily="34" charset="0"/>
+                <a:cs typeface="Times New Roman" panose="02020603050405020304" pitchFamily="18" charset="0"/>
+              </a:rPr>
+              <a:t> </a:t>
+            </a:r>
+            <a:r>
+              <a:rPr lang="da-DK" sz="1400" dirty="0" err="1">
+                <a:latin typeface="Calibri" panose="020F0502020204030204" pitchFamily="34" charset="0"/>
+                <a:ea typeface="Calibri" panose="020F0502020204030204" pitchFamily="34" charset="0"/>
+                <a:cs typeface="Times New Roman" panose="02020603050405020304" pitchFamily="18" charset="0"/>
+              </a:rPr>
+              <a:t>Requirements</a:t>
+            </a:r>
+            <a:r>
+              <a:rPr lang="da-DK" sz="1400" dirty="0">
+                <a:latin typeface="Calibri" panose="020F0502020204030204" pitchFamily="34" charset="0"/>
+                <a:ea typeface="Calibri" panose="020F0502020204030204" pitchFamily="34" charset="0"/>
+                <a:cs typeface="Times New Roman" panose="02020603050405020304" pitchFamily="18" charset="0"/>
+              </a:rPr>
+              <a:t> and Information</a:t>
+            </a:r>
+          </a:p>
+          <a:p>
+            <a:pPr marL="0" indent="0">
+              <a:buNone/>
+            </a:pPr>
+            <a:r>
+              <a:rPr lang="da-DK" sz="1400" dirty="0">
+                <a:latin typeface="Calibri" panose="020F0502020204030204" pitchFamily="34" charset="0"/>
+                <a:ea typeface="Calibri" panose="020F0502020204030204" pitchFamily="34" charset="0"/>
+                <a:cs typeface="Times New Roman" panose="02020603050405020304" pitchFamily="18" charset="0"/>
+              </a:rPr>
+              <a:t>	</a:t>
+            </a:r>
+            <a:r>
+              <a:rPr lang="da-DK" sz="1400" dirty="0" err="1">
+                <a:latin typeface="Calibri" panose="020F0502020204030204" pitchFamily="34" charset="0"/>
+                <a:ea typeface="Calibri" panose="020F0502020204030204" pitchFamily="34" charset="0"/>
+                <a:cs typeface="Times New Roman" panose="02020603050405020304" pitchFamily="18" charset="0"/>
+              </a:rPr>
+              <a:t>Define</a:t>
+            </a:r>
+            <a:r>
+              <a:rPr lang="da-DK" sz="1400" dirty="0">
+                <a:latin typeface="Calibri" panose="020F0502020204030204" pitchFamily="34" charset="0"/>
+                <a:ea typeface="Calibri" panose="020F0502020204030204" pitchFamily="34" charset="0"/>
+                <a:cs typeface="Times New Roman" panose="02020603050405020304" pitchFamily="18" charset="0"/>
+              </a:rPr>
+              <a:t> the </a:t>
+            </a:r>
+            <a:r>
+              <a:rPr lang="da-DK" sz="1400" dirty="0" err="1">
+                <a:latin typeface="Calibri" panose="020F0502020204030204" pitchFamily="34" charset="0"/>
+                <a:ea typeface="Calibri" panose="020F0502020204030204" pitchFamily="34" charset="0"/>
+                <a:cs typeface="Times New Roman" panose="02020603050405020304" pitchFamily="18" charset="0"/>
+              </a:rPr>
+              <a:t>Actors</a:t>
+            </a:r>
+            <a:endParaRPr lang="da-DK" sz="1400" dirty="0">
+              <a:latin typeface="Calibri" panose="020F0502020204030204" pitchFamily="34" charset="0"/>
+              <a:ea typeface="Calibri" panose="020F0502020204030204" pitchFamily="34" charset="0"/>
+              <a:cs typeface="Times New Roman" panose="02020603050405020304" pitchFamily="18" charset="0"/>
+            </a:endParaRPr>
+          </a:p>
+          <a:p>
+            <a:pPr marL="0" indent="0">
+              <a:buNone/>
+            </a:pPr>
+            <a:r>
+              <a:rPr lang="da-DK" sz="1400" dirty="0">
+                <a:latin typeface="Calibri" panose="020F0502020204030204" pitchFamily="34" charset="0"/>
+                <a:ea typeface="Calibri" panose="020F0502020204030204" pitchFamily="34" charset="0"/>
+                <a:cs typeface="Times New Roman" panose="02020603050405020304" pitchFamily="18" charset="0"/>
+              </a:rPr>
+              <a:t>	Create the scenario outline</a:t>
+            </a:r>
+          </a:p>
+          <a:p>
+            <a:pPr marL="0" indent="0">
+              <a:buNone/>
+            </a:pPr>
+            <a:r>
+              <a:rPr lang="da-DK" sz="1400" dirty="0">
+                <a:latin typeface="Calibri" panose="020F0502020204030204" pitchFamily="34" charset="0"/>
+                <a:ea typeface="Calibri" panose="020F0502020204030204" pitchFamily="34" charset="0"/>
+                <a:cs typeface="Times New Roman" panose="02020603050405020304" pitchFamily="18" charset="0"/>
+              </a:rPr>
+              <a:t>	Consider variations and Edge cases</a:t>
+            </a:r>
+          </a:p>
+          <a:p>
+            <a:pPr marL="0" indent="0">
+              <a:buNone/>
+            </a:pPr>
+            <a:r>
+              <a:rPr lang="da-DK" sz="1400" dirty="0">
+                <a:latin typeface="Calibri" panose="020F0502020204030204" pitchFamily="34" charset="0"/>
+                <a:ea typeface="Calibri" panose="020F0502020204030204" pitchFamily="34" charset="0"/>
+                <a:cs typeface="Times New Roman" panose="02020603050405020304" pitchFamily="18" charset="0"/>
+              </a:rPr>
+              <a:t>	Document the scenario</a:t>
+            </a:r>
+          </a:p>
+          <a:p>
+            <a:pPr marL="0" indent="0">
+              <a:buNone/>
+            </a:pPr>
+            <a:r>
+              <a:rPr lang="da-DK" sz="1400" dirty="0">
+                <a:latin typeface="Calibri" panose="020F0502020204030204" pitchFamily="34" charset="0"/>
+                <a:ea typeface="Calibri" panose="020F0502020204030204" pitchFamily="34" charset="0"/>
+                <a:cs typeface="Times New Roman" panose="02020603050405020304" pitchFamily="18" charset="0"/>
+              </a:rPr>
+              <a:t>	Review and Validate</a:t>
+            </a:r>
+          </a:p>
+          <a:p>
+            <a:pPr marL="0" indent="0">
+              <a:buNone/>
+            </a:pPr>
+            <a:r>
+              <a:rPr lang="da-DK" sz="1400" dirty="0">
+                <a:latin typeface="Calibri" panose="020F0502020204030204" pitchFamily="34" charset="0"/>
+                <a:ea typeface="Calibri" panose="020F0502020204030204" pitchFamily="34" charset="0"/>
+                <a:cs typeface="Times New Roman" panose="02020603050405020304" pitchFamily="18" charset="0"/>
+              </a:rPr>
+              <a:t>	Implement and Test</a:t>
+            </a:r>
+          </a:p>
+          <a:p>
+            <a:pPr marL="0" indent="0">
+              <a:buNone/>
+            </a:pPr>
+            <a:endParaRPr lang="en-GB" sz="1400" dirty="0">
+              <a:latin typeface="Calibri" panose="020F0502020204030204" pitchFamily="34" charset="0"/>
+              <a:ea typeface="Calibri" panose="020F0502020204030204" pitchFamily="34" charset="0"/>
+              <a:cs typeface="Times New Roman" panose="02020603050405020304" pitchFamily="18" charset="0"/>
+            </a:endParaRPr>
+          </a:p>
+          <a:p>
+            <a:pPr marL="0" indent="0">
+              <a:buNone/>
+            </a:pPr>
+            <a:endParaRPr lang="en-GB" sz="1400" dirty="0">
+              <a:latin typeface="Calibri" panose="020F0502020204030204" pitchFamily="34" charset="0"/>
+              <a:ea typeface="Calibri" panose="020F0502020204030204" pitchFamily="34" charset="0"/>
+              <a:cs typeface="Times New Roman" panose="02020603050405020304" pitchFamily="18" charset="0"/>
+            </a:endParaRPr>
+          </a:p>
+          <a:p>
+            <a:pPr marL="0" indent="0">
+              <a:buNone/>
+            </a:pPr>
+            <a:endParaRPr lang="en-GB" sz="1400" dirty="0">
+              <a:latin typeface="Calibri" panose="020F0502020204030204" pitchFamily="34" charset="0"/>
+              <a:ea typeface="Calibri" panose="020F0502020204030204" pitchFamily="34" charset="0"/>
+              <a:cs typeface="Times New Roman" panose="02020603050405020304" pitchFamily="18" charset="0"/>
+            </a:endParaRPr>
           </a:p>
         </p:txBody>
       </p:sp>
     </p:spTree>
     <p:extLst>
       <p:ext uri="{BB962C8B-B14F-4D97-AF65-F5344CB8AC3E}">
-        <p14:creationId xmlns:p14="http://schemas.microsoft.com/office/powerpoint/2010/main" val="309736569"/>
+        <p14:creationId xmlns:p14="http://schemas.microsoft.com/office/powerpoint/2010/main" val="2354998779"/>
       </p:ext>
     </p:extLst>
   </p:cSld>
@@ -7775,10 +8617,308 @@
       </p:grpSpPr>
       <p:sp>
         <p:nvSpPr>
+          <p:cNvPr id="3" name="Content Placeholder 2">
+            <a:extLst>
+              <a:ext uri="{FF2B5EF4-FFF2-40B4-BE49-F238E27FC236}">
+                <a16:creationId xmlns:a16="http://schemas.microsoft.com/office/drawing/2014/main" id="{3742B76F-3E7B-C9EB-90BB-1CB2A5510CFB}"/>
+              </a:ext>
+            </a:extLst>
+          </p:cNvPr>
+          <p:cNvSpPr>
+            <a:spLocks noGrp="1"/>
+          </p:cNvSpPr>
+          <p:nvPr>
+            <p:ph idx="1"/>
+          </p:nvPr>
+        </p:nvSpPr>
+        <p:spPr>
+          <a:xfrm>
+            <a:off x="1484310" y="499621"/>
+            <a:ext cx="10018713" cy="5882325"/>
+          </a:xfrm>
+        </p:spPr>
+        <p:txBody>
+          <a:bodyPr anchor="t">
+            <a:normAutofit/>
+          </a:bodyPr>
+          <a:lstStyle/>
+          <a:p>
+            <a:pPr marL="0" indent="0">
+              <a:buNone/>
+            </a:pPr>
+            <a:r>
+              <a:rPr lang="en-GB" sz="1400" dirty="0">
+                <a:latin typeface="Calibri" panose="020F0502020204030204" pitchFamily="34" charset="0"/>
+                <a:ea typeface="Calibri" panose="020F0502020204030204" pitchFamily="34" charset="0"/>
+                <a:cs typeface="Times New Roman" panose="02020603050405020304" pitchFamily="18" charset="0"/>
+              </a:rPr>
+              <a:t>Scenarios for the “RiskPoint Group” website are identified based on the understanding of end user.</a:t>
+            </a:r>
+          </a:p>
+          <a:p>
+            <a:pPr marL="0" indent="0">
+              <a:buNone/>
+            </a:pPr>
+            <a:r>
+              <a:rPr lang="en-GB" sz="1400" dirty="0">
+                <a:latin typeface="Calibri" panose="020F0502020204030204" pitchFamily="34" charset="0"/>
+                <a:ea typeface="Calibri" panose="020F0502020204030204" pitchFamily="34" charset="0"/>
+                <a:cs typeface="Times New Roman" panose="02020603050405020304" pitchFamily="18" charset="0"/>
+              </a:rPr>
+              <a:t>These scenarios for the website has been authored using BDD framework using Cucumber, for the easy understanding of test being done on the website (audience such as end-user, testers or stakeholders). Below is the sample of the scenario in BDD framework .</a:t>
+            </a:r>
+          </a:p>
+          <a:p>
+            <a:pPr marL="0" indent="0">
+              <a:buNone/>
+            </a:pPr>
+            <a:r>
+              <a:rPr lang="en-GB" sz="1400" b="1" dirty="0">
+                <a:solidFill>
+                  <a:srgbClr val="FF0000"/>
+                </a:solidFill>
+                <a:latin typeface="Calibri" panose="020F0502020204030204" pitchFamily="34" charset="0"/>
+                <a:ea typeface="Calibri" panose="020F0502020204030204" pitchFamily="34" charset="0"/>
+                <a:cs typeface="Times New Roman" panose="02020603050405020304" pitchFamily="18" charset="0"/>
+              </a:rPr>
+              <a:t>Feature: </a:t>
+            </a:r>
+            <a:r>
+              <a:rPr lang="en-GB" sz="1400" dirty="0">
+                <a:latin typeface="Calibri" panose="020F0502020204030204" pitchFamily="34" charset="0"/>
+                <a:ea typeface="Calibri" panose="020F0502020204030204" pitchFamily="34" charset="0"/>
+                <a:cs typeface="Times New Roman" panose="02020603050405020304" pitchFamily="18" charset="0"/>
+              </a:rPr>
+              <a:t>Claims</a:t>
+            </a:r>
+          </a:p>
+          <a:p>
+            <a:pPr marL="0" indent="0">
+              <a:buNone/>
+            </a:pPr>
+            <a:r>
+              <a:rPr lang="en-GB" sz="1400" dirty="0">
+                <a:latin typeface="Calibri" panose="020F0502020204030204" pitchFamily="34" charset="0"/>
+                <a:ea typeface="Calibri" panose="020F0502020204030204" pitchFamily="34" charset="0"/>
+                <a:cs typeface="Times New Roman" panose="02020603050405020304" pitchFamily="18" charset="0"/>
+              </a:rPr>
+              <a:t>    </a:t>
+            </a:r>
+            <a:r>
+              <a:rPr lang="en-GB" sz="1400" b="1" dirty="0">
+                <a:solidFill>
+                  <a:srgbClr val="FF0000"/>
+                </a:solidFill>
+                <a:latin typeface="Calibri" panose="020F0502020204030204" pitchFamily="34" charset="0"/>
+                <a:ea typeface="Calibri" panose="020F0502020204030204" pitchFamily="34" charset="0"/>
+                <a:cs typeface="Times New Roman" panose="02020603050405020304" pitchFamily="18" charset="0"/>
+              </a:rPr>
+              <a:t>Scenario: </a:t>
+            </a:r>
+            <a:r>
+              <a:rPr lang="en-GB" sz="1400" dirty="0">
+                <a:latin typeface="Calibri" panose="020F0502020204030204" pitchFamily="34" charset="0"/>
+                <a:ea typeface="Calibri" panose="020F0502020204030204" pitchFamily="34" charset="0"/>
+                <a:cs typeface="Times New Roman" panose="02020603050405020304" pitchFamily="18" charset="0"/>
+              </a:rPr>
+              <a:t>Verify the Home Page of RiskPoint Group</a:t>
+            </a:r>
+          </a:p>
+          <a:p>
+            <a:pPr marL="0" indent="0">
+              <a:buNone/>
+            </a:pPr>
+            <a:r>
+              <a:rPr lang="en-GB" sz="1400" dirty="0">
+                <a:latin typeface="Calibri" panose="020F0502020204030204" pitchFamily="34" charset="0"/>
+                <a:ea typeface="Calibri" panose="020F0502020204030204" pitchFamily="34" charset="0"/>
+                <a:cs typeface="Times New Roman" panose="02020603050405020304" pitchFamily="18" charset="0"/>
+              </a:rPr>
+              <a:t>        </a:t>
+            </a:r>
+            <a:r>
+              <a:rPr lang="en-GB" sz="1400" b="1" dirty="0">
+                <a:solidFill>
+                  <a:srgbClr val="FF0000"/>
+                </a:solidFill>
+                <a:latin typeface="Calibri" panose="020F0502020204030204" pitchFamily="34" charset="0"/>
+                <a:ea typeface="Calibri" panose="020F0502020204030204" pitchFamily="34" charset="0"/>
+                <a:cs typeface="Times New Roman" panose="02020603050405020304" pitchFamily="18" charset="0"/>
+              </a:rPr>
+              <a:t>Given</a:t>
+            </a:r>
+            <a:r>
+              <a:rPr lang="en-GB" sz="1400" dirty="0">
+                <a:latin typeface="Calibri" panose="020F0502020204030204" pitchFamily="34" charset="0"/>
+                <a:ea typeface="Calibri" panose="020F0502020204030204" pitchFamily="34" charset="0"/>
+                <a:cs typeface="Times New Roman" panose="02020603050405020304" pitchFamily="18" charset="0"/>
+              </a:rPr>
+              <a:t> I am on the home page of 'rpgroup.com'</a:t>
+            </a:r>
+          </a:p>
+          <a:p>
+            <a:pPr marL="0" indent="0">
+              <a:buNone/>
+            </a:pPr>
+            <a:r>
+              <a:rPr lang="en-GB" sz="1400" dirty="0">
+                <a:latin typeface="Calibri" panose="020F0502020204030204" pitchFamily="34" charset="0"/>
+                <a:ea typeface="Calibri" panose="020F0502020204030204" pitchFamily="34" charset="0"/>
+                <a:cs typeface="Times New Roman" panose="02020603050405020304" pitchFamily="18" charset="0"/>
+              </a:rPr>
+              <a:t>        </a:t>
+            </a:r>
+            <a:r>
+              <a:rPr lang="en-GB" sz="1400" b="1" dirty="0">
+                <a:solidFill>
+                  <a:srgbClr val="FF0000"/>
+                </a:solidFill>
+                <a:latin typeface="Calibri" panose="020F0502020204030204" pitchFamily="34" charset="0"/>
+                <a:ea typeface="Calibri" panose="020F0502020204030204" pitchFamily="34" charset="0"/>
+                <a:cs typeface="Times New Roman" panose="02020603050405020304" pitchFamily="18" charset="0"/>
+              </a:rPr>
+              <a:t>When</a:t>
+            </a:r>
+            <a:r>
+              <a:rPr lang="en-GB" sz="1400" dirty="0">
+                <a:latin typeface="Calibri" panose="020F0502020204030204" pitchFamily="34" charset="0"/>
+                <a:ea typeface="Calibri" panose="020F0502020204030204" pitchFamily="34" charset="0"/>
+                <a:cs typeface="Times New Roman" panose="02020603050405020304" pitchFamily="18" charset="0"/>
+              </a:rPr>
+              <a:t> On the home page User hovers on Claims tab</a:t>
+            </a:r>
+          </a:p>
+          <a:p>
+            <a:pPr marL="0" indent="0">
+              <a:buNone/>
+            </a:pPr>
+            <a:r>
+              <a:rPr lang="en-GB" sz="1400" dirty="0">
+                <a:latin typeface="Calibri" panose="020F0502020204030204" pitchFamily="34" charset="0"/>
+                <a:ea typeface="Calibri" panose="020F0502020204030204" pitchFamily="34" charset="0"/>
+                <a:cs typeface="Times New Roman" panose="02020603050405020304" pitchFamily="18" charset="0"/>
+              </a:rPr>
+              <a:t>        </a:t>
+            </a:r>
+            <a:r>
+              <a:rPr lang="en-GB" sz="1400" b="1" dirty="0">
+                <a:solidFill>
+                  <a:srgbClr val="FF0000"/>
+                </a:solidFill>
+                <a:latin typeface="Calibri" panose="020F0502020204030204" pitchFamily="34" charset="0"/>
+                <a:ea typeface="Calibri" panose="020F0502020204030204" pitchFamily="34" charset="0"/>
+                <a:cs typeface="Times New Roman" panose="02020603050405020304" pitchFamily="18" charset="0"/>
+              </a:rPr>
+              <a:t>Then</a:t>
+            </a:r>
+            <a:r>
+              <a:rPr lang="en-GB" sz="1400" dirty="0">
+                <a:latin typeface="Calibri" panose="020F0502020204030204" pitchFamily="34" charset="0"/>
+                <a:ea typeface="Calibri" panose="020F0502020204030204" pitchFamily="34" charset="0"/>
+                <a:cs typeface="Times New Roman" panose="02020603050405020304" pitchFamily="18" charset="0"/>
+              </a:rPr>
+              <a:t> Emergency Contacts section should be displayed</a:t>
+            </a:r>
+          </a:p>
+          <a:p>
+            <a:pPr marL="0" indent="0">
+              <a:buNone/>
+            </a:pPr>
+            <a:r>
+              <a:rPr lang="en-GB" sz="1400" dirty="0">
+                <a:latin typeface="Calibri" panose="020F0502020204030204" pitchFamily="34" charset="0"/>
+                <a:ea typeface="Calibri" panose="020F0502020204030204" pitchFamily="34" charset="0"/>
+                <a:cs typeface="Times New Roman" panose="02020603050405020304" pitchFamily="18" charset="0"/>
+              </a:rPr>
+              <a:t>        </a:t>
+            </a:r>
+            <a:r>
+              <a:rPr lang="en-GB" sz="1400" b="1" dirty="0">
+                <a:solidFill>
+                  <a:srgbClr val="FF0000"/>
+                </a:solidFill>
+                <a:latin typeface="Calibri" panose="020F0502020204030204" pitchFamily="34" charset="0"/>
+                <a:ea typeface="Calibri" panose="020F0502020204030204" pitchFamily="34" charset="0"/>
+                <a:cs typeface="Times New Roman" panose="02020603050405020304" pitchFamily="18" charset="0"/>
+              </a:rPr>
+              <a:t>And</a:t>
+            </a:r>
+            <a:r>
+              <a:rPr lang="en-GB" sz="1400" dirty="0">
+                <a:latin typeface="Calibri" panose="020F0502020204030204" pitchFamily="34" charset="0"/>
+                <a:ea typeface="Calibri" panose="020F0502020204030204" pitchFamily="34" charset="0"/>
+                <a:cs typeface="Times New Roman" panose="02020603050405020304" pitchFamily="18" charset="0"/>
+              </a:rPr>
+              <a:t> Report a Claim section should be displayed</a:t>
+            </a:r>
+          </a:p>
+          <a:p>
+            <a:pPr marL="0" indent="0">
+              <a:buNone/>
+            </a:pPr>
+            <a:r>
+              <a:rPr lang="en-GB" sz="1400" b="1" dirty="0">
+                <a:latin typeface="Calibri" panose="020F0502020204030204" pitchFamily="34" charset="0"/>
+                <a:ea typeface="Calibri" panose="020F0502020204030204" pitchFamily="34" charset="0"/>
+                <a:cs typeface="Times New Roman" panose="02020603050405020304" pitchFamily="18" charset="0"/>
+              </a:rPr>
+              <a:t>Test Scripting</a:t>
+            </a:r>
+            <a:r>
+              <a:rPr lang="da-DK" sz="1400" b="1" dirty="0">
+                <a:latin typeface="Calibri" panose="020F0502020204030204" pitchFamily="34" charset="0"/>
+                <a:ea typeface="Calibri" panose="020F0502020204030204" pitchFamily="34" charset="0"/>
+                <a:cs typeface="Times New Roman" panose="02020603050405020304" pitchFamily="18" charset="0"/>
+              </a:rPr>
+              <a:t>: </a:t>
+            </a:r>
+            <a:endParaRPr lang="en-GB" sz="1400" dirty="0">
+              <a:latin typeface="Calibri" panose="020F0502020204030204" pitchFamily="34" charset="0"/>
+              <a:ea typeface="Calibri" panose="020F0502020204030204" pitchFamily="34" charset="0"/>
+              <a:cs typeface="Times New Roman" panose="02020603050405020304" pitchFamily="18" charset="0"/>
+            </a:endParaRPr>
+          </a:p>
+          <a:p>
+            <a:endParaRPr lang="en-GB" sz="1400" dirty="0"/>
+          </a:p>
+        </p:txBody>
+      </p:sp>
+    </p:spTree>
+    <p:extLst>
+      <p:ext uri="{BB962C8B-B14F-4D97-AF65-F5344CB8AC3E}">
+        <p14:creationId xmlns:p14="http://schemas.microsoft.com/office/powerpoint/2010/main" val="3071602802"/>
+      </p:ext>
+    </p:extLst>
+  </p:cSld>
+  <p:clrMapOvr>
+    <a:masterClrMapping/>
+  </p:clrMapOvr>
+</p:sld>
+</file>
+
+<file path=ppt/slides/slide9.xml><?xml version="1.0" encoding="utf-8"?>
+<p:sld xmlns:a="http://schemas.openxmlformats.org/drawingml/2006/main" xmlns:r="http://schemas.openxmlformats.org/officeDocument/2006/relationships" xmlns:p="http://schemas.openxmlformats.org/presentationml/2006/main">
+  <p:cSld>
+    <p:spTree>
+      <p:nvGrpSpPr>
+        <p:cNvPr id="1" name=""/>
+        <p:cNvGrpSpPr/>
+        <p:nvPr/>
+      </p:nvGrpSpPr>
+      <p:grpSpPr>
+        <a:xfrm>
+          <a:off x="0" y="0"/>
+          <a:ext cx="0" cy="0"/>
+          <a:chOff x="0" y="0"/>
+          <a:chExt cx="0" cy="0"/>
+        </a:xfrm>
+      </p:grpSpPr>
+      <p:sp>
+        <p:nvSpPr>
           <p:cNvPr id="2" name="Title 1">
             <a:extLst>
               <a:ext uri="{FF2B5EF4-FFF2-40B4-BE49-F238E27FC236}">
-                <a16:creationId xmlns:a16="http://schemas.microsoft.com/office/drawing/2014/main" id="{A8B43563-EFEA-E9D3-48BB-3AD539087CD1}"/>
+                <a16:creationId xmlns:a16="http://schemas.microsoft.com/office/drawing/2014/main" id="{89237210-2C33-57A8-F271-9DBAE07A53DD}"/>
               </a:ext>
             </a:extLst>
           </p:cNvPr>
@@ -7796,7 +8936,7 @@
           <a:p>
             <a:r>
               <a:rPr lang="en-GB" dirty="0"/>
-              <a:t>Final Test Report</a:t>
+              <a:t>Bug Report</a:t>
             </a:r>
           </a:p>
         </p:txBody>
@@ -7806,7 +8946,7 @@
           <p:cNvPr id="3" name="Content Placeholder 2">
             <a:extLst>
               <a:ext uri="{FF2B5EF4-FFF2-40B4-BE49-F238E27FC236}">
-                <a16:creationId xmlns:a16="http://schemas.microsoft.com/office/drawing/2014/main" id="{348F42C1-F152-6218-E6C9-222916743D3E}"/>
+                <a16:creationId xmlns:a16="http://schemas.microsoft.com/office/drawing/2014/main" id="{27F2422E-876A-1CA5-F741-5863A5D39398}"/>
               </a:ext>
             </a:extLst>
           </p:cNvPr>
@@ -7829,7 +8969,7 @@
     </p:spTree>
     <p:extLst>
       <p:ext uri="{BB962C8B-B14F-4D97-AF65-F5344CB8AC3E}">
-        <p14:creationId xmlns:p14="http://schemas.microsoft.com/office/powerpoint/2010/main" val="2034729977"/>
+        <p14:creationId xmlns:p14="http://schemas.microsoft.com/office/powerpoint/2010/main" val="309736569"/>
       </p:ext>
     </p:extLst>
   </p:cSld>

</xml_diff>